<commit_message>
added slide about Nick to project presentation
</commit_message>
<xml_diff>
--- a/designdoc/basnya_v1.pptx
+++ b/designdoc/basnya_v1.pptx
@@ -55,7 +55,7 @@
         <p:txBody>
           <a:bodyPr/>
           <a:p>
-            <a:fld id="{9FE0834A-F86F-4ED3-BC94-06151ACC06D8}" type="slidenum">
+            <a:fld id="{025651C9-D8F6-4559-B325-FC6121C86ECA}" type="slidenum">
               <a:t>&lt;#&gt;</a:t>
             </a:fld>
           </a:p>
@@ -96,7 +96,7 @@
         <p:spPr>
           <a:xfrm>
             <a:off x="1218960" y="547200"/>
-            <a:ext cx="21944520" cy="2289600"/>
+            <a:ext cx="21944880" cy="2289960"/>
           </a:xfrm>
           <a:prstGeom prst="rect">
             <a:avLst/>
@@ -133,7 +133,7 @@
         <p:spPr>
           <a:xfrm>
             <a:off x="1218960" y="3209400"/>
-            <a:ext cx="21944520" cy="3794040"/>
+            <a:ext cx="21944880" cy="3794400"/>
           </a:xfrm>
           <a:prstGeom prst="rect">
             <a:avLst/>
@@ -166,8 +166,8 @@
         </p:nvSpPr>
         <p:spPr>
           <a:xfrm>
-            <a:off x="1218960" y="7364160"/>
-            <a:ext cx="21944520" cy="3794040"/>
+            <a:off x="1218960" y="7364520"/>
+            <a:ext cx="21944880" cy="3794400"/>
           </a:xfrm>
           <a:prstGeom prst="rect">
             <a:avLst/>
@@ -202,7 +202,7 @@
         <p:txBody>
           <a:bodyPr/>
           <a:p>
-            <a:fld id="{F644BFC4-8E58-48D0-9E2A-D97F50AA1856}" type="slidenum">
+            <a:fld id="{B7F1941D-EAC4-4F20-BE0E-480ACE7E1770}" type="slidenum">
               <a:t>&lt;#&gt;</a:t>
             </a:fld>
           </a:p>
@@ -243,7 +243,7 @@
         <p:spPr>
           <a:xfrm>
             <a:off x="1218960" y="547200"/>
-            <a:ext cx="21944520" cy="2289600"/>
+            <a:ext cx="21944880" cy="2289960"/>
           </a:xfrm>
           <a:prstGeom prst="rect">
             <a:avLst/>
@@ -280,7 +280,7 @@
         <p:spPr>
           <a:xfrm>
             <a:off x="1218960" y="3209400"/>
-            <a:ext cx="10708920" cy="3794040"/>
+            <a:ext cx="10708920" cy="3794400"/>
           </a:xfrm>
           <a:prstGeom prst="rect">
             <a:avLst/>
@@ -314,7 +314,7 @@
         <p:spPr>
           <a:xfrm>
             <a:off x="12463560" y="3209400"/>
-            <a:ext cx="10708920" cy="3794040"/>
+            <a:ext cx="10708920" cy="3794400"/>
           </a:xfrm>
           <a:prstGeom prst="rect">
             <a:avLst/>
@@ -347,8 +347,8 @@
         </p:nvSpPr>
         <p:spPr>
           <a:xfrm>
-            <a:off x="1218960" y="7364160"/>
-            <a:ext cx="10708920" cy="3794040"/>
+            <a:off x="1218960" y="7364520"/>
+            <a:ext cx="10708920" cy="3794400"/>
           </a:xfrm>
           <a:prstGeom prst="rect">
             <a:avLst/>
@@ -381,8 +381,8 @@
         </p:nvSpPr>
         <p:spPr>
           <a:xfrm>
-            <a:off x="12463560" y="7364160"/>
-            <a:ext cx="10708920" cy="3794040"/>
+            <a:off x="12463560" y="7364520"/>
+            <a:ext cx="10708920" cy="3794400"/>
           </a:xfrm>
           <a:prstGeom prst="rect">
             <a:avLst/>
@@ -417,7 +417,7 @@
         <p:txBody>
           <a:bodyPr/>
           <a:p>
-            <a:fld id="{336EBBAF-C434-48D4-B054-6753AD831244}" type="slidenum">
+            <a:fld id="{F4460A6E-3037-4CD5-98DF-2C355FA1FD35}" type="slidenum">
               <a:t>&lt;#&gt;</a:t>
             </a:fld>
           </a:p>
@@ -458,7 +458,7 @@
         <p:spPr>
           <a:xfrm>
             <a:off x="1218960" y="547200"/>
-            <a:ext cx="21944520" cy="2289600"/>
+            <a:ext cx="21944880" cy="2289960"/>
           </a:xfrm>
           <a:prstGeom prst="rect">
             <a:avLst/>
@@ -495,7 +495,7 @@
         <p:spPr>
           <a:xfrm>
             <a:off x="1218960" y="3209400"/>
-            <a:ext cx="7065720" cy="3794040"/>
+            <a:ext cx="7066080" cy="3794400"/>
           </a:xfrm>
           <a:prstGeom prst="rect">
             <a:avLst/>
@@ -528,8 +528,8 @@
         </p:nvSpPr>
         <p:spPr>
           <a:xfrm>
-            <a:off x="8638200" y="3209400"/>
-            <a:ext cx="7065720" cy="3794040"/>
+            <a:off x="8638560" y="3209400"/>
+            <a:ext cx="7066080" cy="3794400"/>
           </a:xfrm>
           <a:prstGeom prst="rect">
             <a:avLst/>
@@ -562,8 +562,8 @@
         </p:nvSpPr>
         <p:spPr>
           <a:xfrm>
-            <a:off x="16057800" y="3209400"/>
-            <a:ext cx="7065720" cy="3794040"/>
+            <a:off x="16058520" y="3209400"/>
+            <a:ext cx="7066080" cy="3794400"/>
           </a:xfrm>
           <a:prstGeom prst="rect">
             <a:avLst/>
@@ -596,8 +596,8 @@
         </p:nvSpPr>
         <p:spPr>
           <a:xfrm>
-            <a:off x="1218960" y="7364160"/>
-            <a:ext cx="7065720" cy="3794040"/>
+            <a:off x="1218960" y="7364520"/>
+            <a:ext cx="7066080" cy="3794400"/>
           </a:xfrm>
           <a:prstGeom prst="rect">
             <a:avLst/>
@@ -630,8 +630,8 @@
         </p:nvSpPr>
         <p:spPr>
           <a:xfrm>
-            <a:off x="8638200" y="7364160"/>
-            <a:ext cx="7065720" cy="3794040"/>
+            <a:off x="8638560" y="7364520"/>
+            <a:ext cx="7066080" cy="3794400"/>
           </a:xfrm>
           <a:prstGeom prst="rect">
             <a:avLst/>
@@ -664,8 +664,8 @@
         </p:nvSpPr>
         <p:spPr>
           <a:xfrm>
-            <a:off x="16057800" y="7364160"/>
-            <a:ext cx="7065720" cy="3794040"/>
+            <a:off x="16058520" y="7364520"/>
+            <a:ext cx="7066080" cy="3794400"/>
           </a:xfrm>
           <a:prstGeom prst="rect">
             <a:avLst/>
@@ -700,7 +700,7 @@
         <p:txBody>
           <a:bodyPr/>
           <a:p>
-            <a:fld id="{7FDD0805-0D7E-43DA-BABE-B992FCA28AF3}" type="slidenum">
+            <a:fld id="{9A11D234-3F03-47DB-89D7-ADBB23D5C25A}" type="slidenum">
               <a:t>&lt;#&gt;</a:t>
             </a:fld>
           </a:p>
@@ -742,7 +742,7 @@
         <p:txBody>
           <a:bodyPr/>
           <a:p>
-            <a:fld id="{9F91C016-949F-4898-B211-65FBB54FA119}" type="slidenum">
+            <a:fld id="{C076F1F1-5819-48FC-898E-970FEBA2C8FB}" type="slidenum">
               <a:t>&lt;#&gt;</a:t>
             </a:fld>
           </a:p>
@@ -783,7 +783,7 @@
         <p:spPr>
           <a:xfrm>
             <a:off x="1218960" y="547200"/>
-            <a:ext cx="21944520" cy="2289600"/>
+            <a:ext cx="21944880" cy="2289960"/>
           </a:xfrm>
           <a:prstGeom prst="rect">
             <a:avLst/>
@@ -820,7 +820,7 @@
         <p:spPr>
           <a:xfrm>
             <a:off x="1218960" y="3209400"/>
-            <a:ext cx="21944520" cy="7954560"/>
+            <a:ext cx="21944880" cy="7954920"/>
           </a:xfrm>
           <a:prstGeom prst="rect">
             <a:avLst/>
@@ -858,7 +858,7 @@
         <p:txBody>
           <a:bodyPr/>
           <a:p>
-            <a:fld id="{6B594F26-FF69-4254-BC25-A9B13E26BE96}" type="slidenum">
+            <a:fld id="{1BE822F2-E760-4F7C-B35C-BAC14A637F5A}" type="slidenum">
               <a:t>&lt;#&gt;</a:t>
             </a:fld>
           </a:p>
@@ -899,7 +899,7 @@
         <p:spPr>
           <a:xfrm>
             <a:off x="1218960" y="547200"/>
-            <a:ext cx="21944520" cy="2289600"/>
+            <a:ext cx="21944880" cy="2289960"/>
           </a:xfrm>
           <a:prstGeom prst="rect">
             <a:avLst/>
@@ -936,7 +936,7 @@
         <p:spPr>
           <a:xfrm>
             <a:off x="1218960" y="3209400"/>
-            <a:ext cx="21944520" cy="7954560"/>
+            <a:ext cx="21944880" cy="7954920"/>
           </a:xfrm>
           <a:prstGeom prst="rect">
             <a:avLst/>
@@ -971,7 +971,7 @@
         <p:txBody>
           <a:bodyPr/>
           <a:p>
-            <a:fld id="{DB7A25A1-6F31-40A1-BEE4-4A76B499E515}" type="slidenum">
+            <a:fld id="{606E6B25-E9EC-41CE-92C5-D936EA3832B2}" type="slidenum">
               <a:t>&lt;#&gt;</a:t>
             </a:fld>
           </a:p>
@@ -1012,7 +1012,7 @@
         <p:spPr>
           <a:xfrm>
             <a:off x="1218960" y="547200"/>
-            <a:ext cx="21944520" cy="2289600"/>
+            <a:ext cx="21944880" cy="2289960"/>
           </a:xfrm>
           <a:prstGeom prst="rect">
             <a:avLst/>
@@ -1049,7 +1049,7 @@
         <p:spPr>
           <a:xfrm>
             <a:off x="1218960" y="3209400"/>
-            <a:ext cx="10708920" cy="7954560"/>
+            <a:ext cx="10708920" cy="7954920"/>
           </a:xfrm>
           <a:prstGeom prst="rect">
             <a:avLst/>
@@ -1083,7 +1083,7 @@
         <p:spPr>
           <a:xfrm>
             <a:off x="12463560" y="3209400"/>
-            <a:ext cx="10708920" cy="7954560"/>
+            <a:ext cx="10708920" cy="7954920"/>
           </a:xfrm>
           <a:prstGeom prst="rect">
             <a:avLst/>
@@ -1118,7 +1118,7 @@
         <p:txBody>
           <a:bodyPr/>
           <a:p>
-            <a:fld id="{60BBC301-A2A3-47BF-8297-C632A1A300B4}" type="slidenum">
+            <a:fld id="{9C568E32-A398-43A5-A5FB-4CF16F3FCA5F}" type="slidenum">
               <a:t>&lt;#&gt;</a:t>
             </a:fld>
           </a:p>
@@ -1159,7 +1159,7 @@
         <p:spPr>
           <a:xfrm>
             <a:off x="1218960" y="547200"/>
-            <a:ext cx="21944520" cy="2289600"/>
+            <a:ext cx="21944880" cy="2289960"/>
           </a:xfrm>
           <a:prstGeom prst="rect">
             <a:avLst/>
@@ -1197,7 +1197,7 @@
         <p:txBody>
           <a:bodyPr/>
           <a:p>
-            <a:fld id="{1A8F8835-4D07-4A65-8C23-1177686DD132}" type="slidenum">
+            <a:fld id="{9C30C1B7-514A-4937-8C65-4AFAC1EDC512}" type="slidenum">
               <a:t>&lt;#&gt;</a:t>
             </a:fld>
           </a:p>
@@ -1238,7 +1238,7 @@
         <p:spPr>
           <a:xfrm>
             <a:off x="1218960" y="547200"/>
-            <a:ext cx="21944520" cy="10614600"/>
+            <a:ext cx="21944880" cy="10616040"/>
           </a:xfrm>
           <a:prstGeom prst="rect">
             <a:avLst/>
@@ -1276,7 +1276,7 @@
         <p:txBody>
           <a:bodyPr/>
           <a:p>
-            <a:fld id="{28ECCB26-B66C-49B8-ACA9-61A7AC4353B6}" type="slidenum">
+            <a:fld id="{A44E58E2-2513-415D-BDFA-525F623A54C8}" type="slidenum">
               <a:t>&lt;#&gt;</a:t>
             </a:fld>
           </a:p>
@@ -1317,7 +1317,7 @@
         <p:spPr>
           <a:xfrm>
             <a:off x="1218960" y="547200"/>
-            <a:ext cx="21944520" cy="2289600"/>
+            <a:ext cx="21944880" cy="2289960"/>
           </a:xfrm>
           <a:prstGeom prst="rect">
             <a:avLst/>
@@ -1354,7 +1354,7 @@
         <p:spPr>
           <a:xfrm>
             <a:off x="1218960" y="3209400"/>
-            <a:ext cx="10708920" cy="3794040"/>
+            <a:ext cx="10708920" cy="3794400"/>
           </a:xfrm>
           <a:prstGeom prst="rect">
             <a:avLst/>
@@ -1388,7 +1388,7 @@
         <p:spPr>
           <a:xfrm>
             <a:off x="12463560" y="3209400"/>
-            <a:ext cx="10708920" cy="7954560"/>
+            <a:ext cx="10708920" cy="7954920"/>
           </a:xfrm>
           <a:prstGeom prst="rect">
             <a:avLst/>
@@ -1421,8 +1421,8 @@
         </p:nvSpPr>
         <p:spPr>
           <a:xfrm>
-            <a:off x="1218960" y="7364160"/>
-            <a:ext cx="10708920" cy="3794040"/>
+            <a:off x="1218960" y="7364520"/>
+            <a:ext cx="10708920" cy="3794400"/>
           </a:xfrm>
           <a:prstGeom prst="rect">
             <a:avLst/>
@@ -1457,7 +1457,7 @@
         <p:txBody>
           <a:bodyPr/>
           <a:p>
-            <a:fld id="{59E6DB35-A31B-4D30-AABF-88F303A39FAE}" type="slidenum">
+            <a:fld id="{6E958620-3ED2-4AFA-8BB2-F4E3DD9A7A46}" type="slidenum">
               <a:t>&lt;#&gt;</a:t>
             </a:fld>
           </a:p>
@@ -1498,7 +1498,7 @@
         <p:spPr>
           <a:xfrm>
             <a:off x="1218960" y="547200"/>
-            <a:ext cx="21944520" cy="2289600"/>
+            <a:ext cx="21944880" cy="2289960"/>
           </a:xfrm>
           <a:prstGeom prst="rect">
             <a:avLst/>
@@ -1535,7 +1535,7 @@
         <p:spPr>
           <a:xfrm>
             <a:off x="1218960" y="3209400"/>
-            <a:ext cx="21944520" cy="7954560"/>
+            <a:ext cx="21944880" cy="7954920"/>
           </a:xfrm>
           <a:prstGeom prst="rect">
             <a:avLst/>
@@ -1573,7 +1573,7 @@
         <p:txBody>
           <a:bodyPr/>
           <a:p>
-            <a:fld id="{9AC61750-9042-4891-AF57-D1600FDE7F0F}" type="slidenum">
+            <a:fld id="{2BA8F8C6-9F14-424D-826C-D193F9C26A11}" type="slidenum">
               <a:t>&lt;#&gt;</a:t>
             </a:fld>
           </a:p>
@@ -1614,7 +1614,7 @@
         <p:spPr>
           <a:xfrm>
             <a:off x="1218960" y="547200"/>
-            <a:ext cx="21944520" cy="2289600"/>
+            <a:ext cx="21944880" cy="2289960"/>
           </a:xfrm>
           <a:prstGeom prst="rect">
             <a:avLst/>
@@ -1651,7 +1651,7 @@
         <p:spPr>
           <a:xfrm>
             <a:off x="1218960" y="3209400"/>
-            <a:ext cx="10708920" cy="7954560"/>
+            <a:ext cx="10708920" cy="7954920"/>
           </a:xfrm>
           <a:prstGeom prst="rect">
             <a:avLst/>
@@ -1685,7 +1685,7 @@
         <p:spPr>
           <a:xfrm>
             <a:off x="12463560" y="3209400"/>
-            <a:ext cx="10708920" cy="3794040"/>
+            <a:ext cx="10708920" cy="3794400"/>
           </a:xfrm>
           <a:prstGeom prst="rect">
             <a:avLst/>
@@ -1718,8 +1718,8 @@
         </p:nvSpPr>
         <p:spPr>
           <a:xfrm>
-            <a:off x="12463560" y="7364160"/>
-            <a:ext cx="10708920" cy="3794040"/>
+            <a:off x="12463560" y="7364520"/>
+            <a:ext cx="10708920" cy="3794400"/>
           </a:xfrm>
           <a:prstGeom prst="rect">
             <a:avLst/>
@@ -1754,7 +1754,7 @@
         <p:txBody>
           <a:bodyPr/>
           <a:p>
-            <a:fld id="{20A1C5EF-A4E2-4F9D-81A7-B829DE097145}" type="slidenum">
+            <a:fld id="{08FD9573-E3E6-4D27-B6F6-2726D688A62C}" type="slidenum">
               <a:t>&lt;#&gt;</a:t>
             </a:fld>
           </a:p>
@@ -1795,7 +1795,7 @@
         <p:spPr>
           <a:xfrm>
             <a:off x="1218960" y="547200"/>
-            <a:ext cx="21944520" cy="2289600"/>
+            <a:ext cx="21944880" cy="2289960"/>
           </a:xfrm>
           <a:prstGeom prst="rect">
             <a:avLst/>
@@ -1832,7 +1832,7 @@
         <p:spPr>
           <a:xfrm>
             <a:off x="1218960" y="3209400"/>
-            <a:ext cx="10708920" cy="3794040"/>
+            <a:ext cx="10708920" cy="3794400"/>
           </a:xfrm>
           <a:prstGeom prst="rect">
             <a:avLst/>
@@ -1866,7 +1866,7 @@
         <p:spPr>
           <a:xfrm>
             <a:off x="12463560" y="3209400"/>
-            <a:ext cx="10708920" cy="3794040"/>
+            <a:ext cx="10708920" cy="3794400"/>
           </a:xfrm>
           <a:prstGeom prst="rect">
             <a:avLst/>
@@ -1899,8 +1899,8 @@
         </p:nvSpPr>
         <p:spPr>
           <a:xfrm>
-            <a:off x="1218960" y="7364160"/>
-            <a:ext cx="21944520" cy="3794040"/>
+            <a:off x="1218960" y="7364520"/>
+            <a:ext cx="21944880" cy="3794400"/>
           </a:xfrm>
           <a:prstGeom prst="rect">
             <a:avLst/>
@@ -1935,7 +1935,7 @@
         <p:txBody>
           <a:bodyPr/>
           <a:p>
-            <a:fld id="{BBC00F21-2C9E-4837-8FDB-7132722D0270}" type="slidenum">
+            <a:fld id="{9441F8F9-0026-4ADD-8DA8-F6102AC096BF}" type="slidenum">
               <a:t>&lt;#&gt;</a:t>
             </a:fld>
           </a:p>
@@ -1976,7 +1976,7 @@
         <p:spPr>
           <a:xfrm>
             <a:off x="1218960" y="547200"/>
-            <a:ext cx="21944520" cy="2289600"/>
+            <a:ext cx="21944880" cy="2289960"/>
           </a:xfrm>
           <a:prstGeom prst="rect">
             <a:avLst/>
@@ -2013,7 +2013,7 @@
         <p:spPr>
           <a:xfrm>
             <a:off x="1218960" y="3209400"/>
-            <a:ext cx="21944520" cy="3794040"/>
+            <a:ext cx="21944880" cy="3794400"/>
           </a:xfrm>
           <a:prstGeom prst="rect">
             <a:avLst/>
@@ -2046,8 +2046,8 @@
         </p:nvSpPr>
         <p:spPr>
           <a:xfrm>
-            <a:off x="1218960" y="7364160"/>
-            <a:ext cx="21944520" cy="3794040"/>
+            <a:off x="1218960" y="7364520"/>
+            <a:ext cx="21944880" cy="3794400"/>
           </a:xfrm>
           <a:prstGeom prst="rect">
             <a:avLst/>
@@ -2082,7 +2082,7 @@
         <p:txBody>
           <a:bodyPr/>
           <a:p>
-            <a:fld id="{4FAFDF85-BB89-4433-9142-6BCB97554288}" type="slidenum">
+            <a:fld id="{CF8753A8-69FB-4074-AACA-62FE432107AE}" type="slidenum">
               <a:t>&lt;#&gt;</a:t>
             </a:fld>
           </a:p>
@@ -2123,7 +2123,7 @@
         <p:spPr>
           <a:xfrm>
             <a:off x="1218960" y="547200"/>
-            <a:ext cx="21944520" cy="2289600"/>
+            <a:ext cx="21944880" cy="2289960"/>
           </a:xfrm>
           <a:prstGeom prst="rect">
             <a:avLst/>
@@ -2160,7 +2160,7 @@
         <p:spPr>
           <a:xfrm>
             <a:off x="1218960" y="3209400"/>
-            <a:ext cx="10708920" cy="3794040"/>
+            <a:ext cx="10708920" cy="3794400"/>
           </a:xfrm>
           <a:prstGeom prst="rect">
             <a:avLst/>
@@ -2194,7 +2194,7 @@
         <p:spPr>
           <a:xfrm>
             <a:off x="12463560" y="3209400"/>
-            <a:ext cx="10708920" cy="3794040"/>
+            <a:ext cx="10708920" cy="3794400"/>
           </a:xfrm>
           <a:prstGeom prst="rect">
             <a:avLst/>
@@ -2227,8 +2227,8 @@
         </p:nvSpPr>
         <p:spPr>
           <a:xfrm>
-            <a:off x="1218960" y="7364160"/>
-            <a:ext cx="10708920" cy="3794040"/>
+            <a:off x="1218960" y="7364520"/>
+            <a:ext cx="10708920" cy="3794400"/>
           </a:xfrm>
           <a:prstGeom prst="rect">
             <a:avLst/>
@@ -2261,8 +2261,8 @@
         </p:nvSpPr>
         <p:spPr>
           <a:xfrm>
-            <a:off x="12463560" y="7364160"/>
-            <a:ext cx="10708920" cy="3794040"/>
+            <a:off x="12463560" y="7364520"/>
+            <a:ext cx="10708920" cy="3794400"/>
           </a:xfrm>
           <a:prstGeom prst="rect">
             <a:avLst/>
@@ -2297,7 +2297,7 @@
         <p:txBody>
           <a:bodyPr/>
           <a:p>
-            <a:fld id="{B71DB8A4-5CAC-48DA-8EAE-992836249FE5}" type="slidenum">
+            <a:fld id="{89783517-DDB6-455D-84DE-A368F045F2A8}" type="slidenum">
               <a:t>&lt;#&gt;</a:t>
             </a:fld>
           </a:p>
@@ -2338,7 +2338,7 @@
         <p:spPr>
           <a:xfrm>
             <a:off x="1218960" y="547200"/>
-            <a:ext cx="21944520" cy="2289600"/>
+            <a:ext cx="21944880" cy="2289960"/>
           </a:xfrm>
           <a:prstGeom prst="rect">
             <a:avLst/>
@@ -2375,7 +2375,7 @@
         <p:spPr>
           <a:xfrm>
             <a:off x="1218960" y="3209400"/>
-            <a:ext cx="7065720" cy="3794040"/>
+            <a:ext cx="7066080" cy="3794400"/>
           </a:xfrm>
           <a:prstGeom prst="rect">
             <a:avLst/>
@@ -2408,8 +2408,8 @@
         </p:nvSpPr>
         <p:spPr>
           <a:xfrm>
-            <a:off x="8638200" y="3209400"/>
-            <a:ext cx="7065720" cy="3794040"/>
+            <a:off x="8638560" y="3209400"/>
+            <a:ext cx="7066080" cy="3794400"/>
           </a:xfrm>
           <a:prstGeom prst="rect">
             <a:avLst/>
@@ -2442,8 +2442,8 @@
         </p:nvSpPr>
         <p:spPr>
           <a:xfrm>
-            <a:off x="16057800" y="3209400"/>
-            <a:ext cx="7065720" cy="3794040"/>
+            <a:off x="16058520" y="3209400"/>
+            <a:ext cx="7066080" cy="3794400"/>
           </a:xfrm>
           <a:prstGeom prst="rect">
             <a:avLst/>
@@ -2476,8 +2476,8 @@
         </p:nvSpPr>
         <p:spPr>
           <a:xfrm>
-            <a:off x="1218960" y="7364160"/>
-            <a:ext cx="7065720" cy="3794040"/>
+            <a:off x="1218960" y="7364520"/>
+            <a:ext cx="7066080" cy="3794400"/>
           </a:xfrm>
           <a:prstGeom prst="rect">
             <a:avLst/>
@@ -2510,8 +2510,8 @@
         </p:nvSpPr>
         <p:spPr>
           <a:xfrm>
-            <a:off x="8638200" y="7364160"/>
-            <a:ext cx="7065720" cy="3794040"/>
+            <a:off x="8638560" y="7364520"/>
+            <a:ext cx="7066080" cy="3794400"/>
           </a:xfrm>
           <a:prstGeom prst="rect">
             <a:avLst/>
@@ -2544,8 +2544,8 @@
         </p:nvSpPr>
         <p:spPr>
           <a:xfrm>
-            <a:off x="16057800" y="7364160"/>
-            <a:ext cx="7065720" cy="3794040"/>
+            <a:off x="16058520" y="7364520"/>
+            <a:ext cx="7066080" cy="3794400"/>
           </a:xfrm>
           <a:prstGeom prst="rect">
             <a:avLst/>
@@ -2580,7 +2580,7 @@
         <p:txBody>
           <a:bodyPr/>
           <a:p>
-            <a:fld id="{5DEB04E5-7051-4F70-B1AD-AE0547B868F7}" type="slidenum">
+            <a:fld id="{DB2688EB-0AB1-4737-8D43-3BB78AA5E0DE}" type="slidenum">
               <a:t>&lt;#&gt;</a:t>
             </a:fld>
           </a:p>
@@ -2621,7 +2621,7 @@
         <p:spPr>
           <a:xfrm>
             <a:off x="1218960" y="547200"/>
-            <a:ext cx="21944520" cy="2289600"/>
+            <a:ext cx="21944880" cy="2289960"/>
           </a:xfrm>
           <a:prstGeom prst="rect">
             <a:avLst/>
@@ -2658,7 +2658,7 @@
         <p:spPr>
           <a:xfrm>
             <a:off x="1218960" y="3209400"/>
-            <a:ext cx="21944520" cy="7954560"/>
+            <a:ext cx="21944880" cy="7954920"/>
           </a:xfrm>
           <a:prstGeom prst="rect">
             <a:avLst/>
@@ -2693,7 +2693,7 @@
         <p:txBody>
           <a:bodyPr/>
           <a:p>
-            <a:fld id="{E2D5D4B4-563F-4C82-94E0-0F727D7F7451}" type="slidenum">
+            <a:fld id="{159279D0-9F5B-42FC-95C4-FC7778DBD1A3}" type="slidenum">
               <a:t>&lt;#&gt;</a:t>
             </a:fld>
           </a:p>
@@ -2734,7 +2734,7 @@
         <p:spPr>
           <a:xfrm>
             <a:off x="1218960" y="547200"/>
-            <a:ext cx="21944520" cy="2289600"/>
+            <a:ext cx="21944880" cy="2289960"/>
           </a:xfrm>
           <a:prstGeom prst="rect">
             <a:avLst/>
@@ -2771,7 +2771,7 @@
         <p:spPr>
           <a:xfrm>
             <a:off x="1218960" y="3209400"/>
-            <a:ext cx="10708920" cy="7954560"/>
+            <a:ext cx="10708920" cy="7954920"/>
           </a:xfrm>
           <a:prstGeom prst="rect">
             <a:avLst/>
@@ -2805,7 +2805,7 @@
         <p:spPr>
           <a:xfrm>
             <a:off x="12463560" y="3209400"/>
-            <a:ext cx="10708920" cy="7954560"/>
+            <a:ext cx="10708920" cy="7954920"/>
           </a:xfrm>
           <a:prstGeom prst="rect">
             <a:avLst/>
@@ -2840,7 +2840,7 @@
         <p:txBody>
           <a:bodyPr/>
           <a:p>
-            <a:fld id="{F6601D03-ACDE-4E33-8387-B291344FD6D3}" type="slidenum">
+            <a:fld id="{B4320D48-0C89-4E1A-B00A-B2BF2E37F601}" type="slidenum">
               <a:t>&lt;#&gt;</a:t>
             </a:fld>
           </a:p>
@@ -2881,7 +2881,7 @@
         <p:spPr>
           <a:xfrm>
             <a:off x="1218960" y="547200"/>
-            <a:ext cx="21944520" cy="2289600"/>
+            <a:ext cx="21944880" cy="2289960"/>
           </a:xfrm>
           <a:prstGeom prst="rect">
             <a:avLst/>
@@ -2919,7 +2919,7 @@
         <p:txBody>
           <a:bodyPr/>
           <a:p>
-            <a:fld id="{5594CB0F-D4EF-4818-BA96-52A8ADFE552F}" type="slidenum">
+            <a:fld id="{BF82E2F9-E3E5-4D49-A1AF-1FE6ECE341FE}" type="slidenum">
               <a:t>&lt;#&gt;</a:t>
             </a:fld>
           </a:p>
@@ -2960,7 +2960,7 @@
         <p:spPr>
           <a:xfrm>
             <a:off x="1218960" y="547200"/>
-            <a:ext cx="21944520" cy="10614600"/>
+            <a:ext cx="21944880" cy="10616040"/>
           </a:xfrm>
           <a:prstGeom prst="rect">
             <a:avLst/>
@@ -2998,7 +2998,7 @@
         <p:txBody>
           <a:bodyPr/>
           <a:p>
-            <a:fld id="{BDBBB9E6-52C9-4023-B831-E352989A8E71}" type="slidenum">
+            <a:fld id="{23FBECA9-66B5-4FB0-B3F6-CC4EADB7BDB2}" type="slidenum">
               <a:t>&lt;#&gt;</a:t>
             </a:fld>
           </a:p>
@@ -3039,7 +3039,7 @@
         <p:spPr>
           <a:xfrm>
             <a:off x="1218960" y="547200"/>
-            <a:ext cx="21944520" cy="2289600"/>
+            <a:ext cx="21944880" cy="2289960"/>
           </a:xfrm>
           <a:prstGeom prst="rect">
             <a:avLst/>
@@ -3076,7 +3076,7 @@
         <p:spPr>
           <a:xfrm>
             <a:off x="1218960" y="3209400"/>
-            <a:ext cx="10708920" cy="3794040"/>
+            <a:ext cx="10708920" cy="3794400"/>
           </a:xfrm>
           <a:prstGeom prst="rect">
             <a:avLst/>
@@ -3110,7 +3110,7 @@
         <p:spPr>
           <a:xfrm>
             <a:off x="12463560" y="3209400"/>
-            <a:ext cx="10708920" cy="7954560"/>
+            <a:ext cx="10708920" cy="7954920"/>
           </a:xfrm>
           <a:prstGeom prst="rect">
             <a:avLst/>
@@ -3143,8 +3143,8 @@
         </p:nvSpPr>
         <p:spPr>
           <a:xfrm>
-            <a:off x="1218960" y="7364160"/>
-            <a:ext cx="10708920" cy="3794040"/>
+            <a:off x="1218960" y="7364520"/>
+            <a:ext cx="10708920" cy="3794400"/>
           </a:xfrm>
           <a:prstGeom prst="rect">
             <a:avLst/>
@@ -3179,7 +3179,7 @@
         <p:txBody>
           <a:bodyPr/>
           <a:p>
-            <a:fld id="{C4BC3A72-28AA-43C2-9116-E1AD02056104}" type="slidenum">
+            <a:fld id="{5C70B528-2535-4007-A1CF-46F43EFCDE3D}" type="slidenum">
               <a:t>&lt;#&gt;</a:t>
             </a:fld>
           </a:p>
@@ -3220,7 +3220,7 @@
         <p:spPr>
           <a:xfrm>
             <a:off x="1218960" y="547200"/>
-            <a:ext cx="21944520" cy="2289600"/>
+            <a:ext cx="21944880" cy="2289960"/>
           </a:xfrm>
           <a:prstGeom prst="rect">
             <a:avLst/>
@@ -3257,7 +3257,7 @@
         <p:spPr>
           <a:xfrm>
             <a:off x="1218960" y="3209400"/>
-            <a:ext cx="10708920" cy="7954560"/>
+            <a:ext cx="10708920" cy="7954920"/>
           </a:xfrm>
           <a:prstGeom prst="rect">
             <a:avLst/>
@@ -3291,7 +3291,7 @@
         <p:spPr>
           <a:xfrm>
             <a:off x="12463560" y="3209400"/>
-            <a:ext cx="10708920" cy="3794040"/>
+            <a:ext cx="10708920" cy="3794400"/>
           </a:xfrm>
           <a:prstGeom prst="rect">
             <a:avLst/>
@@ -3324,8 +3324,8 @@
         </p:nvSpPr>
         <p:spPr>
           <a:xfrm>
-            <a:off x="12463560" y="7364160"/>
-            <a:ext cx="10708920" cy="3794040"/>
+            <a:off x="12463560" y="7364520"/>
+            <a:ext cx="10708920" cy="3794400"/>
           </a:xfrm>
           <a:prstGeom prst="rect">
             <a:avLst/>
@@ -3360,7 +3360,7 @@
         <p:txBody>
           <a:bodyPr/>
           <a:p>
-            <a:fld id="{3A4FD1E8-9EF1-4366-ADC3-7921F9AC3F96}" type="slidenum">
+            <a:fld id="{9D3C7CBE-C853-4213-ABC0-0B53358EACB5}" type="slidenum">
               <a:t>&lt;#&gt;</a:t>
             </a:fld>
           </a:p>
@@ -3401,7 +3401,7 @@
         <p:spPr>
           <a:xfrm>
             <a:off x="1218960" y="547200"/>
-            <a:ext cx="21944520" cy="2289600"/>
+            <a:ext cx="21944880" cy="2289960"/>
           </a:xfrm>
           <a:prstGeom prst="rect">
             <a:avLst/>
@@ -3438,7 +3438,7 @@
         <p:spPr>
           <a:xfrm>
             <a:off x="1218960" y="3209400"/>
-            <a:ext cx="10708920" cy="3794040"/>
+            <a:ext cx="10708920" cy="3794400"/>
           </a:xfrm>
           <a:prstGeom prst="rect">
             <a:avLst/>
@@ -3472,7 +3472,7 @@
         <p:spPr>
           <a:xfrm>
             <a:off x="12463560" y="3209400"/>
-            <a:ext cx="10708920" cy="3794040"/>
+            <a:ext cx="10708920" cy="3794400"/>
           </a:xfrm>
           <a:prstGeom prst="rect">
             <a:avLst/>
@@ -3505,8 +3505,8 @@
         </p:nvSpPr>
         <p:spPr>
           <a:xfrm>
-            <a:off x="1218960" y="7364160"/>
-            <a:ext cx="21944520" cy="3794040"/>
+            <a:off x="1218960" y="7364520"/>
+            <a:ext cx="21944880" cy="3794400"/>
           </a:xfrm>
           <a:prstGeom prst="rect">
             <a:avLst/>
@@ -3541,7 +3541,7 @@
         <p:txBody>
           <a:bodyPr/>
           <a:p>
-            <a:fld id="{FE6FB197-F5F5-426D-8802-BDAF34EF672D}" type="slidenum">
+            <a:fld id="{666105CC-1246-453D-8CBF-AD6CE07B13B0}" type="slidenum">
               <a:t>&lt;#&gt;</a:t>
             </a:fld>
           </a:p>
@@ -3589,7 +3589,7 @@
         <p:spPr>
           <a:xfrm>
             <a:off x="20574000" y="12344400"/>
-            <a:ext cx="2742840" cy="685440"/>
+            <a:ext cx="2742480" cy="685080"/>
           </a:xfrm>
           <a:prstGeom prst="rect">
             <a:avLst/>
@@ -3631,7 +3631,7 @@
                 <a:tab algn="l" pos="0"/>
               </a:tabLst>
             </a:pPr>
-            <a:fld id="{61CAFFB5-1034-43A9-8E6B-51D8B59B00F9}" type="slidenum">
+            <a:fld id="{0B80A338-40E9-4A0F-A03E-E27AC67AD813}" type="slidenum">
               <a:rPr b="0" lang="en-US" sz="2800" spc="-1" strike="noStrike">
                 <a:solidFill>
                   <a:srgbClr val="000000"/>
@@ -3639,7 +3639,7 @@
                 <a:latin typeface="Helvetica Neue Light"/>
                 <a:ea typeface="Helvetica Neue Light"/>
               </a:rPr>
-              <a:t>&lt;number&gt;</a:t>
+              <a:t>4</a:t>
             </a:fld>
             <a:endParaRPr b="0" lang="en-US" sz="2800" spc="-1" strike="noStrike">
               <a:latin typeface="Times New Roman"/>
@@ -3682,13 +3682,19 @@
               <a:rPr b="0" lang="en-US" sz="4400" spc="-1" strike="noStrike">
                 <a:latin typeface="Arial"/>
               </a:rPr>
-              <a:t>Click to edit the title </a:t>
+              <a:t>Click to edit </a:t>
             </a:r>
             <a:r>
               <a:rPr b="0" lang="en-US" sz="4400" spc="-1" strike="noStrike">
                 <a:latin typeface="Arial"/>
               </a:rPr>
-              <a:t>text format</a:t>
+              <a:t>the title text </a:t>
+            </a:r>
+            <a:r>
+              <a:rPr b="0" lang="en-US" sz="4400" spc="-1" strike="noStrike">
+                <a:latin typeface="Arial"/>
+              </a:rPr>
+              <a:t>format</a:t>
             </a:r>
             <a:endParaRPr b="0" lang="en-US" sz="4400" spc="-1" strike="noStrike">
               <a:latin typeface="Arial"/>
@@ -3930,242 +3936,13 @@
             <a:spLocks noGrp="1"/>
           </p:cNvSpPr>
           <p:nvPr>
-            <p:ph type="title"/>
-          </p:nvPr>
-        </p:nvSpPr>
-        <p:spPr>
-          <a:xfrm>
-            <a:off x="1218960" y="547200"/>
-            <a:ext cx="21944520" cy="2289600"/>
-          </a:xfrm>
-          <a:prstGeom prst="rect">
-            <a:avLst/>
-          </a:prstGeom>
-          <a:noFill/>
-          <a:ln w="0">
-            <a:noFill/>
-          </a:ln>
-        </p:spPr>
-        <p:txBody>
-          <a:bodyPr lIns="0" rIns="0" tIns="0" bIns="0" anchor="ctr">
-            <a:noAutofit/>
-          </a:bodyPr>
-          <a:p>
-            <a:r>
-              <a:rPr b="0" lang="en-US" sz="1800" spc="-1" strike="noStrike">
-                <a:latin typeface="Arial"/>
-              </a:rPr>
-              <a:t>Click to edit the </a:t>
-            </a:r>
-            <a:r>
-              <a:rPr b="0" lang="en-US" sz="1800" spc="-1" strike="noStrike">
-                <a:latin typeface="Arial"/>
-              </a:rPr>
-              <a:t>title text format</a:t>
-            </a:r>
-            <a:endParaRPr b="0" lang="en-US" sz="1800" spc="-1" strike="noStrike">
-              <a:latin typeface="Arial"/>
-            </a:endParaRPr>
-          </a:p>
-        </p:txBody>
-      </p:sp>
-      <p:sp>
-        <p:nvSpPr>
-          <p:cNvPr id="40" name="PlaceHolder 2"/>
-          <p:cNvSpPr>
-            <a:spLocks noGrp="1"/>
-          </p:cNvSpPr>
-          <p:nvPr>
-            <p:ph type="body"/>
-          </p:nvPr>
-        </p:nvSpPr>
-        <p:spPr>
-          <a:xfrm>
-            <a:off x="1218960" y="3209400"/>
-            <a:ext cx="21944520" cy="7954560"/>
-          </a:xfrm>
-          <a:prstGeom prst="rect">
-            <a:avLst/>
-          </a:prstGeom>
-          <a:noFill/>
-          <a:ln w="0">
-            <a:noFill/>
-          </a:ln>
-        </p:spPr>
-        <p:txBody>
-          <a:bodyPr lIns="0" rIns="0" tIns="0" bIns="0" anchor="t">
-            <a:normAutofit/>
-          </a:bodyPr>
-          <a:p>
-            <a:pPr marL="432000" indent="-324000">
-              <a:spcBef>
-                <a:spcPts val="1417"/>
-              </a:spcBef>
-              <a:buClr>
-                <a:srgbClr val="ffffff"/>
-              </a:buClr>
-              <a:buSzPct val="45000"/>
-              <a:buFont typeface="Wingdings" charset="2"/>
-              <a:buChar char=""/>
-            </a:pPr>
-            <a:r>
-              <a:rPr b="0" lang="en-US" sz="1800" spc="-1" strike="noStrike">
-                <a:latin typeface="Arial"/>
-              </a:rPr>
-              <a:t>Click to edit the outline text format</a:t>
-            </a:r>
-            <a:endParaRPr b="0" lang="en-US" sz="1800" spc="-1" strike="noStrike">
-              <a:latin typeface="Arial"/>
-            </a:endParaRPr>
-          </a:p>
-          <a:p>
-            <a:pPr lvl="1" marL="864000" indent="-324000">
-              <a:spcBef>
-                <a:spcPts val="1134"/>
-              </a:spcBef>
-              <a:buClr>
-                <a:srgbClr val="ffffff"/>
-              </a:buClr>
-              <a:buSzPct val="75000"/>
-              <a:buFont typeface="Symbol" charset="2"/>
-              <a:buChar char=""/>
-            </a:pPr>
-            <a:r>
-              <a:rPr b="0" lang="en-US" sz="1800" spc="-1" strike="noStrike">
-                <a:latin typeface="Arial"/>
-              </a:rPr>
-              <a:t>Second Outline Level</a:t>
-            </a:r>
-            <a:endParaRPr b="0" lang="en-US" sz="1800" spc="-1" strike="noStrike">
-              <a:latin typeface="Arial"/>
-            </a:endParaRPr>
-          </a:p>
-          <a:p>
-            <a:pPr lvl="2" marL="1296000" indent="-288000">
-              <a:spcBef>
-                <a:spcPts val="850"/>
-              </a:spcBef>
-              <a:buClr>
-                <a:srgbClr val="ffffff"/>
-              </a:buClr>
-              <a:buSzPct val="45000"/>
-              <a:buFont typeface="Wingdings" charset="2"/>
-              <a:buChar char=""/>
-            </a:pPr>
-            <a:r>
-              <a:rPr b="0" lang="en-US" sz="1800" spc="-1" strike="noStrike">
-                <a:latin typeface="Arial"/>
-              </a:rPr>
-              <a:t>Third Outline Level</a:t>
-            </a:r>
-            <a:endParaRPr b="0" lang="en-US" sz="1800" spc="-1" strike="noStrike">
-              <a:latin typeface="Arial"/>
-            </a:endParaRPr>
-          </a:p>
-          <a:p>
-            <a:pPr lvl="3" marL="1728000" indent="-216000">
-              <a:spcBef>
-                <a:spcPts val="567"/>
-              </a:spcBef>
-              <a:buClr>
-                <a:srgbClr val="ffffff"/>
-              </a:buClr>
-              <a:buSzPct val="75000"/>
-              <a:buFont typeface="Symbol" charset="2"/>
-              <a:buChar char=""/>
-            </a:pPr>
-            <a:r>
-              <a:rPr b="0" lang="en-US" sz="1800" spc="-1" strike="noStrike">
-                <a:latin typeface="Arial"/>
-              </a:rPr>
-              <a:t>Fourth Outline Level</a:t>
-            </a:r>
-            <a:endParaRPr b="0" lang="en-US" sz="1800" spc="-1" strike="noStrike">
-              <a:latin typeface="Arial"/>
-            </a:endParaRPr>
-          </a:p>
-          <a:p>
-            <a:pPr lvl="4" marL="2160000" indent="-216000">
-              <a:spcBef>
-                <a:spcPts val="283"/>
-              </a:spcBef>
-              <a:buClr>
-                <a:srgbClr val="ffffff"/>
-              </a:buClr>
-              <a:buSzPct val="45000"/>
-              <a:buFont typeface="Wingdings" charset="2"/>
-              <a:buChar char=""/>
-            </a:pPr>
-            <a:r>
-              <a:rPr b="0" lang="en-US" sz="1800" spc="-1" strike="noStrike">
-                <a:latin typeface="Arial"/>
-              </a:rPr>
-              <a:t>Fifth Outline Level</a:t>
-            </a:r>
-            <a:endParaRPr b="0" lang="en-US" sz="1800" spc="-1" strike="noStrike">
-              <a:latin typeface="Arial"/>
-            </a:endParaRPr>
-          </a:p>
-          <a:p>
-            <a:pPr lvl="5" marL="2592000" indent="-216000">
-              <a:spcBef>
-                <a:spcPts val="283"/>
-              </a:spcBef>
-              <a:buClr>
-                <a:srgbClr val="ffffff"/>
-              </a:buClr>
-              <a:buSzPct val="45000"/>
-              <a:buFont typeface="Wingdings" charset="2"/>
-              <a:buChar char=""/>
-            </a:pPr>
-            <a:r>
-              <a:rPr b="0" lang="en-US" sz="1800" spc="-1" strike="noStrike">
-                <a:latin typeface="Arial"/>
-              </a:rPr>
-              <a:t>Sixth Outline Level</a:t>
-            </a:r>
-            <a:endParaRPr b="0" lang="en-US" sz="1800" spc="-1" strike="noStrike">
-              <a:latin typeface="Arial"/>
-            </a:endParaRPr>
-          </a:p>
-          <a:p>
-            <a:pPr lvl="6" marL="3024000" indent="-216000">
-              <a:spcBef>
-                <a:spcPts val="283"/>
-              </a:spcBef>
-              <a:buClr>
-                <a:srgbClr val="ffffff"/>
-              </a:buClr>
-              <a:buSzPct val="45000"/>
-              <a:buFont typeface="Wingdings" charset="2"/>
-              <a:buChar char=""/>
-            </a:pPr>
-            <a:r>
-              <a:rPr b="0" lang="en-US" sz="1800" spc="-1" strike="noStrike">
-                <a:latin typeface="Arial"/>
-              </a:rPr>
-              <a:t>Seventh Outline Level</a:t>
-            </a:r>
-            <a:endParaRPr b="0" lang="en-US" sz="1800" spc="-1" strike="noStrike">
-              <a:latin typeface="Arial"/>
-            </a:endParaRPr>
-          </a:p>
-        </p:txBody>
-      </p:sp>
-      <p:sp>
-        <p:nvSpPr>
-          <p:cNvPr id="41" name="PlaceHolder 3"/>
-          <p:cNvSpPr>
-            <a:spLocks noGrp="1"/>
-          </p:cNvSpPr>
-          <p:nvPr>
             <p:ph type="sldNum" idx="2"/>
           </p:nvPr>
         </p:nvSpPr>
         <p:spPr>
           <a:xfrm>
             <a:off x="20345400" y="12290040"/>
-            <a:ext cx="3039120" cy="968400"/>
+            <a:ext cx="3038760" cy="968040"/>
           </a:xfrm>
           <a:prstGeom prst="rect">
             <a:avLst/>
@@ -4207,7 +3984,7 @@
                 <a:tab algn="l" pos="0"/>
               </a:tabLst>
             </a:pPr>
-            <a:fld id="{7EB66BB3-E652-475A-AD41-8AF992A226E0}" type="slidenum">
+            <a:fld id="{593CAFBE-634F-4239-AACA-3CD6DC09CFA0}" type="slidenum">
               <a:rPr b="0" lang="en-US" sz="2800" spc="-1" strike="noStrike">
                 <a:solidFill>
                   <a:srgbClr val="000000"/>
@@ -4219,6 +3996,238 @@
             </a:fld>
             <a:endParaRPr b="0" lang="en-US" sz="2800" spc="-1" strike="noStrike">
               <a:latin typeface="Times New Roman"/>
+            </a:endParaRPr>
+          </a:p>
+        </p:txBody>
+      </p:sp>
+      <p:sp>
+        <p:nvSpPr>
+          <p:cNvPr id="40" name="PlaceHolder 2"/>
+          <p:cNvSpPr>
+            <a:spLocks noGrp="1"/>
+          </p:cNvSpPr>
+          <p:nvPr>
+            <p:ph type="title"/>
+          </p:nvPr>
+        </p:nvSpPr>
+        <p:spPr>
+          <a:xfrm>
+            <a:off x="1218960" y="547200"/>
+            <a:ext cx="21944880" cy="2289960"/>
+          </a:xfrm>
+          <a:prstGeom prst="rect">
+            <a:avLst/>
+          </a:prstGeom>
+          <a:noFill/>
+          <a:ln w="0">
+            <a:noFill/>
+          </a:ln>
+        </p:spPr>
+        <p:txBody>
+          <a:bodyPr lIns="0" rIns="0" tIns="0" bIns="0" anchor="ctr">
+            <a:noAutofit/>
+          </a:bodyPr>
+          <a:p>
+            <a:pPr algn="ctr">
+              <a:buNone/>
+            </a:pPr>
+            <a:r>
+              <a:rPr b="0" lang="en-US" sz="4400" spc="-1" strike="noStrike">
+                <a:latin typeface="Arial"/>
+              </a:rPr>
+              <a:t>Click to edit the title </a:t>
+            </a:r>
+            <a:r>
+              <a:rPr b="0" lang="en-US" sz="4400" spc="-1" strike="noStrike">
+                <a:latin typeface="Arial"/>
+              </a:rPr>
+              <a:t>text format</a:t>
+            </a:r>
+            <a:endParaRPr b="0" lang="en-US" sz="4400" spc="-1" strike="noStrike">
+              <a:latin typeface="Arial"/>
+            </a:endParaRPr>
+          </a:p>
+        </p:txBody>
+      </p:sp>
+      <p:sp>
+        <p:nvSpPr>
+          <p:cNvPr id="41" name="PlaceHolder 3"/>
+          <p:cNvSpPr>
+            <a:spLocks noGrp="1"/>
+          </p:cNvSpPr>
+          <p:nvPr>
+            <p:ph type="body"/>
+          </p:nvPr>
+        </p:nvSpPr>
+        <p:spPr>
+          <a:xfrm>
+            <a:off x="1218960" y="3209400"/>
+            <a:ext cx="21944880" cy="7954920"/>
+          </a:xfrm>
+          <a:prstGeom prst="rect">
+            <a:avLst/>
+          </a:prstGeom>
+          <a:noFill/>
+          <a:ln w="0">
+            <a:noFill/>
+          </a:ln>
+        </p:spPr>
+        <p:txBody>
+          <a:bodyPr lIns="0" rIns="0" tIns="0" bIns="0" anchor="t">
+            <a:normAutofit/>
+          </a:bodyPr>
+          <a:p>
+            <a:pPr marL="432000" indent="-324000">
+              <a:spcBef>
+                <a:spcPts val="1417"/>
+              </a:spcBef>
+              <a:buClr>
+                <a:srgbClr val="ffffff"/>
+              </a:buClr>
+              <a:buSzPct val="45000"/>
+              <a:buFont typeface="Wingdings" charset="2"/>
+              <a:buChar char=""/>
+            </a:pPr>
+            <a:r>
+              <a:rPr b="0" lang="en-US" sz="3200" spc="-1" strike="noStrike">
+                <a:latin typeface="Arial"/>
+              </a:rPr>
+              <a:t>Click to edit the outline text format</a:t>
+            </a:r>
+            <a:endParaRPr b="0" lang="en-US" sz="3200" spc="-1" strike="noStrike">
+              <a:latin typeface="Arial"/>
+            </a:endParaRPr>
+          </a:p>
+          <a:p>
+            <a:pPr lvl="1" marL="864000" indent="-324000">
+              <a:spcBef>
+                <a:spcPts val="1134"/>
+              </a:spcBef>
+              <a:buClr>
+                <a:srgbClr val="ffffff"/>
+              </a:buClr>
+              <a:buSzPct val="75000"/>
+              <a:buFont typeface="Symbol" charset="2"/>
+              <a:buChar char=""/>
+            </a:pPr>
+            <a:r>
+              <a:rPr b="0" lang="en-US" sz="2800" spc="-1" strike="noStrike">
+                <a:latin typeface="Arial"/>
+              </a:rPr>
+              <a:t>Second Outline Level</a:t>
+            </a:r>
+            <a:endParaRPr b="0" lang="en-US" sz="2800" spc="-1" strike="noStrike">
+              <a:latin typeface="Arial"/>
+            </a:endParaRPr>
+          </a:p>
+          <a:p>
+            <a:pPr lvl="2" marL="1296000" indent="-288000">
+              <a:spcBef>
+                <a:spcPts val="850"/>
+              </a:spcBef>
+              <a:buClr>
+                <a:srgbClr val="ffffff"/>
+              </a:buClr>
+              <a:buSzPct val="45000"/>
+              <a:buFont typeface="Wingdings" charset="2"/>
+              <a:buChar char=""/>
+            </a:pPr>
+            <a:r>
+              <a:rPr b="0" lang="en-US" sz="2400" spc="-1" strike="noStrike">
+                <a:latin typeface="Arial"/>
+              </a:rPr>
+              <a:t>Third Outline Level</a:t>
+            </a:r>
+            <a:endParaRPr b="0" lang="en-US" sz="2400" spc="-1" strike="noStrike">
+              <a:latin typeface="Arial"/>
+            </a:endParaRPr>
+          </a:p>
+          <a:p>
+            <a:pPr lvl="3" marL="1728000" indent="-216000">
+              <a:spcBef>
+                <a:spcPts val="567"/>
+              </a:spcBef>
+              <a:buClr>
+                <a:srgbClr val="ffffff"/>
+              </a:buClr>
+              <a:buSzPct val="75000"/>
+              <a:buFont typeface="Symbol" charset="2"/>
+              <a:buChar char=""/>
+            </a:pPr>
+            <a:r>
+              <a:rPr b="0" lang="en-US" sz="2000" spc="-1" strike="noStrike">
+                <a:latin typeface="Arial"/>
+              </a:rPr>
+              <a:t>Fourth Outline Level</a:t>
+            </a:r>
+            <a:endParaRPr b="0" lang="en-US" sz="2000" spc="-1" strike="noStrike">
+              <a:latin typeface="Arial"/>
+            </a:endParaRPr>
+          </a:p>
+          <a:p>
+            <a:pPr lvl="4" marL="2160000" indent="-216000">
+              <a:spcBef>
+                <a:spcPts val="283"/>
+              </a:spcBef>
+              <a:buClr>
+                <a:srgbClr val="ffffff"/>
+              </a:buClr>
+              <a:buSzPct val="45000"/>
+              <a:buFont typeface="Wingdings" charset="2"/>
+              <a:buChar char=""/>
+            </a:pPr>
+            <a:r>
+              <a:rPr b="0" lang="en-US" sz="2000" spc="-1" strike="noStrike">
+                <a:latin typeface="Arial"/>
+              </a:rPr>
+              <a:t>Fifth Outline Level</a:t>
+            </a:r>
+            <a:endParaRPr b="0" lang="en-US" sz="2000" spc="-1" strike="noStrike">
+              <a:latin typeface="Arial"/>
+            </a:endParaRPr>
+          </a:p>
+          <a:p>
+            <a:pPr lvl="5" marL="2592000" indent="-216000">
+              <a:spcBef>
+                <a:spcPts val="283"/>
+              </a:spcBef>
+              <a:buClr>
+                <a:srgbClr val="ffffff"/>
+              </a:buClr>
+              <a:buSzPct val="45000"/>
+              <a:buFont typeface="Wingdings" charset="2"/>
+              <a:buChar char=""/>
+            </a:pPr>
+            <a:r>
+              <a:rPr b="0" lang="en-US" sz="2000" spc="-1" strike="noStrike">
+                <a:latin typeface="Arial"/>
+              </a:rPr>
+              <a:t>Sixth Outline Level</a:t>
+            </a:r>
+            <a:endParaRPr b="0" lang="en-US" sz="2000" spc="-1" strike="noStrike">
+              <a:latin typeface="Arial"/>
+            </a:endParaRPr>
+          </a:p>
+          <a:p>
+            <a:pPr lvl="6" marL="3024000" indent="-216000">
+              <a:spcBef>
+                <a:spcPts val="283"/>
+              </a:spcBef>
+              <a:buClr>
+                <a:srgbClr val="ffffff"/>
+              </a:buClr>
+              <a:buSzPct val="45000"/>
+              <a:buFont typeface="Wingdings" charset="2"/>
+              <a:buChar char=""/>
+            </a:pPr>
+            <a:r>
+              <a:rPr b="0" lang="en-US" sz="2000" spc="-1" strike="noStrike">
+                <a:latin typeface="Arial"/>
+              </a:rPr>
+              <a:t>Seventh Outline Level</a:t>
+            </a:r>
+            <a:endParaRPr b="0" lang="en-US" sz="2000" spc="-1" strike="noStrike">
+              <a:latin typeface="Arial"/>
             </a:endParaRPr>
           </a:p>
         </p:txBody>
@@ -4269,7 +4278,7 @@
         <p:spPr>
           <a:xfrm>
             <a:off x="2781360" y="1333440"/>
-            <a:ext cx="27590040" cy="11048400"/>
+            <a:ext cx="27589680" cy="11048040"/>
           </a:xfrm>
           <a:prstGeom prst="roundRect">
             <a:avLst>
@@ -4301,7 +4310,7 @@
         <p:spPr>
           <a:xfrm>
             <a:off x="3706920" y="2119320"/>
-            <a:ext cx="9400320" cy="9400320"/>
+            <a:ext cx="9399960" cy="9399960"/>
           </a:xfrm>
           <a:prstGeom prst="ellipse">
             <a:avLst/>
@@ -4329,7 +4338,7 @@
         <p:spPr>
           <a:xfrm>
             <a:off x="5706360" y="5685120"/>
-            <a:ext cx="5125320" cy="1624680"/>
+            <a:ext cx="5124960" cy="1624680"/>
           </a:xfrm>
           <a:prstGeom prst="rect">
             <a:avLst/>
@@ -4384,7 +4393,7 @@
         <p:spPr>
           <a:xfrm>
             <a:off x="6026760" y="7139160"/>
-            <a:ext cx="4484160" cy="1929240"/>
+            <a:ext cx="4483800" cy="1929240"/>
           </a:xfrm>
           <a:prstGeom prst="rect">
             <a:avLst/>
@@ -4444,7 +4453,7 @@
         <p:txBody>
           <a:bodyPr/>
           <a:p>
-            <a:fld id="{F41241A9-49FC-49D4-B4DD-2EF43E086F86}" type="slidenum">
+            <a:fld id="{388B2B7D-E3B9-418E-82D3-FBFA6BB4B24C}" type="slidenum">
               <a:t>1</a:t>
             </a:fld>
           </a:p>
@@ -4482,14 +4491,14 @@
       </p:grpSpPr>
       <p:sp>
         <p:nvSpPr>
-          <p:cNvPr id="131" name="Title text slide 5"/>
+          <p:cNvPr id="132" name="Title text slide 5"/>
           <p:cNvSpPr/>
           <p:nvPr/>
         </p:nvSpPr>
         <p:spPr>
           <a:xfrm>
             <a:off x="2394720" y="2072880"/>
-            <a:ext cx="19550520" cy="1319760"/>
+            <a:ext cx="19550160" cy="1319760"/>
           </a:xfrm>
           <a:prstGeom prst="rect">
             <a:avLst/>
@@ -4537,14 +4546,14 @@
       </p:sp>
       <p:sp>
         <p:nvSpPr>
-          <p:cNvPr id="132" name="Lorem ipsum dolor sit amet, consectetur adipiscing elit, sed do eiusmod tempor incididunt ut labore et dolore magna aliqua. Ut enim ad minim veniam, quis nostrud exercitation ullamco laboris nisi ut aliquip ex ea commodo consequat. Duis aute irure dolor in reprehenderit in voluptate velit esse cillum dolore eu fugiat nulla pariatur. Excepteur sint occaecat cupidatat non proident, sunt in culpa qui officia deserunt mollit anim id est laborum.… 4"/>
+          <p:cNvPr id="133" name="Lorem ipsum dolor sit amet, consectetur adipiscing elit, sed do eiusmod tempor incididunt ut labore et dolore magna aliqua. Ut enim ad minim veniam, quis nostrud exercitation ullamco laboris nisi ut aliquip ex ea commodo consequat. Duis aute irure dolor in reprehenderit in voluptate velit esse cillum dolore eu fugiat nulla pariatur. Excepteur sint occaecat cupidatat non proident, sunt in culpa qui officia deserunt mollit anim id est laborum.… 4"/>
           <p:cNvSpPr/>
           <p:nvPr/>
         </p:nvSpPr>
         <p:spPr>
           <a:xfrm>
             <a:off x="1600200" y="4572000"/>
-            <a:ext cx="20802600" cy="6891480"/>
+            <a:ext cx="20802240" cy="6890760"/>
           </a:xfrm>
           <a:prstGeom prst="rect">
             <a:avLst/>
@@ -4809,7 +4818,7 @@
         <p:txBody>
           <a:bodyPr/>
           <a:p>
-            <a:fld id="{4DF0025E-8E9C-4680-A4B2-39C22427B469}" type="slidenum">
+            <a:fld id="{E0307154-1F7B-43EF-8CD9-4AB434A5ED1B}" type="slidenum">
               <a:t>10</a:t>
             </a:fld>
           </a:p>
@@ -4847,14 +4856,14 @@
       </p:grpSpPr>
       <p:sp>
         <p:nvSpPr>
-          <p:cNvPr id="133" name="Title text slide 20"/>
+          <p:cNvPr id="134" name="Title text slide 20"/>
           <p:cNvSpPr/>
           <p:nvPr/>
         </p:nvSpPr>
         <p:spPr>
           <a:xfrm>
             <a:off x="2394720" y="2072880"/>
-            <a:ext cx="19550520" cy="1319760"/>
+            <a:ext cx="19550160" cy="1319760"/>
           </a:xfrm>
           <a:prstGeom prst="rect">
             <a:avLst/>
@@ -4902,14 +4911,14 @@
       </p:sp>
       <p:sp>
         <p:nvSpPr>
-          <p:cNvPr id="134" name="Lorem ipsum dolor sit amet, consectetur adipiscing elit, sed do eiusmod tempor incididunt ut labore et dolore magna aliqua. Ut enim ad minim veniam, quis nostrud exercitation ullamco laboris nisi ut aliquip ex ea commodo consequat. Duis aute irure dolor in reprehenderit in voluptate velit esse cillum dolore eu fugiat nulla pariatur. Excepteur sint occaecat cupidatat non proident, sunt in culpa qui officia deserunt mollit anim id est laborum.… 1"/>
+          <p:cNvPr id="135" name="Lorem ipsum dolor sit amet, consectetur adipiscing elit, sed do eiusmod tempor incididunt ut labore et dolore magna aliqua. Ut enim ad minim veniam, quis nostrud exercitation ullamco laboris nisi ut aliquip ex ea commodo consequat. Duis aute irure dolor in reprehenderit in voluptate velit esse cillum dolore eu fugiat nulla pariatur. Excepteur sint occaecat cupidatat non proident, sunt in culpa qui officia deserunt mollit anim id est laborum.… 1"/>
           <p:cNvSpPr/>
           <p:nvPr/>
         </p:nvSpPr>
         <p:spPr>
           <a:xfrm>
             <a:off x="2451240" y="5003640"/>
-            <a:ext cx="19226880" cy="5978520"/>
+            <a:ext cx="19226520" cy="5978520"/>
           </a:xfrm>
           <a:prstGeom prst="rect">
             <a:avLst/>
@@ -5107,7 +5116,7 @@
         <p:txBody>
           <a:bodyPr/>
           <a:p>
-            <a:fld id="{A2726F73-C9BE-411F-B587-EEF1D3803EA4}" type="slidenum">
+            <a:fld id="{6E2E2864-DED8-4B0D-B371-A21C7A01FDDA}" type="slidenum">
               <a:t>11</a:t>
             </a:fld>
           </a:p>
@@ -5152,28 +5161,28 @@
       </p:grpSpPr>
       <p:grpSp>
         <p:nvGrpSpPr>
-          <p:cNvPr id="135" name="Группа 29"/>
+          <p:cNvPr id="136" name="Группа 29"/>
           <p:cNvGrpSpPr/>
           <p:nvPr/>
         </p:nvGrpSpPr>
         <p:grpSpPr>
           <a:xfrm>
             <a:off x="1296360" y="1017000"/>
-            <a:ext cx="11681280" cy="11681280"/>
+            <a:ext cx="11680920" cy="11680920"/>
             <a:chOff x="1296360" y="1017000"/>
-            <a:chExt cx="11681280" cy="11681280"/>
+            <a:chExt cx="11680920" cy="11680920"/>
           </a:xfrm>
         </p:grpSpPr>
         <p:sp>
           <p:nvSpPr>
-            <p:cNvPr id="136" name="Кружок 82"/>
+            <p:cNvPr id="137" name="Кружок 82"/>
             <p:cNvSpPr/>
             <p:nvPr/>
           </p:nvSpPr>
           <p:spPr>
             <a:xfrm>
               <a:off x="1296360" y="1017000"/>
-              <a:ext cx="11681280" cy="11681280"/>
+              <a:ext cx="11680920" cy="11680920"/>
             </a:xfrm>
             <a:prstGeom prst="ellipse">
               <a:avLst/>
@@ -5202,14 +5211,14 @@
         </p:sp>
         <p:sp>
           <p:nvSpPr>
-            <p:cNvPr id="137" name="Thank you! 1"/>
+            <p:cNvPr id="138" name="Thank you! 1"/>
             <p:cNvSpPr/>
             <p:nvPr/>
           </p:nvSpPr>
           <p:spPr>
             <a:xfrm>
               <a:off x="2514600" y="5029200"/>
-              <a:ext cx="9513000" cy="3757680"/>
+              <a:ext cx="9512640" cy="3757680"/>
             </a:xfrm>
             <a:prstGeom prst="rect">
               <a:avLst/>
@@ -5271,14 +5280,14 @@
       </p:grpSp>
       <p:sp>
         <p:nvSpPr>
-          <p:cNvPr id="138" name="Закругленный прямоугольник 52"/>
+          <p:cNvPr id="139" name="Закругленный прямоугольник 52"/>
           <p:cNvSpPr/>
           <p:nvPr/>
         </p:nvSpPr>
         <p:spPr>
           <a:xfrm>
             <a:off x="14731920" y="1015920"/>
-            <a:ext cx="18114840" cy="11683440"/>
+            <a:ext cx="18114480" cy="11683080"/>
           </a:xfrm>
           <a:prstGeom prst="roundRect">
             <a:avLst>
@@ -5301,14 +5310,14 @@
       </p:sp>
       <p:sp>
         <p:nvSpPr>
-          <p:cNvPr id="139" name="Кружок 83"/>
+          <p:cNvPr id="140" name="Кружок 83"/>
           <p:cNvSpPr/>
           <p:nvPr/>
         </p:nvSpPr>
         <p:spPr>
           <a:xfrm>
             <a:off x="15976440" y="10906200"/>
-            <a:ext cx="1031040" cy="1031040"/>
+            <a:ext cx="1030680" cy="1030680"/>
           </a:xfrm>
           <a:prstGeom prst="ellipse">
             <a:avLst/>
@@ -5329,14 +5338,14 @@
       </p:sp>
       <p:sp>
         <p:nvSpPr>
-          <p:cNvPr id="140" name="Кружок 84"/>
+          <p:cNvPr id="141" name="Кружок 84"/>
           <p:cNvSpPr/>
           <p:nvPr/>
         </p:nvSpPr>
         <p:spPr>
           <a:xfrm>
             <a:off x="17276760" y="10906200"/>
-            <a:ext cx="1031040" cy="1031040"/>
+            <a:ext cx="1030680" cy="1030680"/>
           </a:xfrm>
           <a:prstGeom prst="ellipse">
             <a:avLst/>
@@ -5357,14 +5366,14 @@
       </p:sp>
       <p:sp>
         <p:nvSpPr>
-          <p:cNvPr id="141" name="Кружок 85"/>
+          <p:cNvPr id="142" name="Кружок 85"/>
           <p:cNvSpPr/>
           <p:nvPr/>
         </p:nvSpPr>
         <p:spPr>
           <a:xfrm>
             <a:off x="18576720" y="10906200"/>
-            <a:ext cx="1031040" cy="1031040"/>
+            <a:ext cx="1030680" cy="1030680"/>
           </a:xfrm>
           <a:prstGeom prst="ellipse">
             <a:avLst/>
@@ -5385,14 +5394,14 @@
       </p:sp>
       <p:sp>
         <p:nvSpPr>
-          <p:cNvPr id="142" name="Кружок 86"/>
+          <p:cNvPr id="143" name="Кружок 86"/>
           <p:cNvSpPr/>
           <p:nvPr/>
         </p:nvSpPr>
         <p:spPr>
           <a:xfrm>
             <a:off x="19877040" y="10906200"/>
-            <a:ext cx="1031040" cy="1031040"/>
+            <a:ext cx="1030680" cy="1030680"/>
           </a:xfrm>
           <a:prstGeom prst="ellipse">
             <a:avLst/>
@@ -5413,14 +5422,14 @@
       </p:sp>
       <p:sp>
         <p:nvSpPr>
-          <p:cNvPr id="143" name="Кружок 87"/>
+          <p:cNvPr id="144" name="Кружок 87"/>
           <p:cNvSpPr/>
           <p:nvPr/>
         </p:nvSpPr>
         <p:spPr>
           <a:xfrm>
             <a:off x="21177000" y="10906200"/>
-            <a:ext cx="1031040" cy="1031040"/>
+            <a:ext cx="1030680" cy="1030680"/>
           </a:xfrm>
           <a:prstGeom prst="ellipse">
             <a:avLst/>
@@ -5441,14 +5450,14 @@
       </p:sp>
       <p:sp>
         <p:nvSpPr>
-          <p:cNvPr id="144" name="Кружок 88"/>
+          <p:cNvPr id="145" name="Кружок 88"/>
           <p:cNvSpPr/>
           <p:nvPr/>
         </p:nvSpPr>
         <p:spPr>
           <a:xfrm>
             <a:off x="22477320" y="10906200"/>
-            <a:ext cx="1031040" cy="1031040"/>
+            <a:ext cx="1030680" cy="1030680"/>
           </a:xfrm>
           <a:prstGeom prst="ellipse">
             <a:avLst/>
@@ -5469,14 +5478,14 @@
       </p:sp>
       <p:sp>
         <p:nvSpPr>
-          <p:cNvPr id="145" name="Кружок 89"/>
+          <p:cNvPr id="146" name="Кружок 89"/>
           <p:cNvSpPr/>
           <p:nvPr/>
         </p:nvSpPr>
         <p:spPr>
           <a:xfrm>
             <a:off x="23777280" y="10906200"/>
-            <a:ext cx="1031040" cy="1031040"/>
+            <a:ext cx="1030680" cy="1030680"/>
           </a:xfrm>
           <a:prstGeom prst="ellipse">
             <a:avLst/>
@@ -5509,7 +5518,7 @@
         <p:txBody>
           <a:bodyPr/>
           <a:p>
-            <a:fld id="{1A441F47-B3D5-477D-A7B0-EF3E18832600}" type="slidenum">
+            <a:fld id="{E364E6FD-DB5C-4BE7-A283-7681C1CAE0B4}" type="slidenum">
               <a:t>12</a:t>
             </a:fld>
           </a:p>
@@ -5554,7 +5563,7 @@
         <p:spPr>
           <a:xfrm>
             <a:off x="2394720" y="2072880"/>
-            <a:ext cx="9111600" cy="1319760"/>
+            <a:ext cx="9111240" cy="1319760"/>
           </a:xfrm>
           <a:prstGeom prst="rect">
             <a:avLst/>
@@ -5609,7 +5618,7 @@
         <p:spPr>
           <a:xfrm>
             <a:off x="2451240" y="5003640"/>
-            <a:ext cx="19265760" cy="5724360"/>
+            <a:ext cx="19265400" cy="5724360"/>
           </a:xfrm>
           <a:prstGeom prst="rect">
             <a:avLst/>
@@ -5817,7 +5826,7 @@
         <p:txBody>
           <a:bodyPr/>
           <a:p>
-            <a:fld id="{EEDC8F55-D9B8-4268-BCD6-D6AAA592536C}" type="slidenum">
+            <a:fld id="{F39CA67C-186E-4B0C-90F4-1403AF40D750}" type="slidenum">
               <a:t>2</a:t>
             </a:fld>
           </a:p>
@@ -5862,7 +5871,7 @@
         <p:spPr>
           <a:xfrm>
             <a:off x="2438280" y="2438280"/>
-            <a:ext cx="6228720" cy="8838360"/>
+            <a:ext cx="6228360" cy="8838000"/>
           </a:xfrm>
           <a:prstGeom prst="roundRect">
             <a:avLst>
@@ -5892,7 +5901,7 @@
         <p:spPr>
           <a:xfrm>
             <a:off x="9077400" y="2438280"/>
-            <a:ext cx="6228720" cy="8838360"/>
+            <a:ext cx="6228360" cy="8838000"/>
           </a:xfrm>
           <a:prstGeom prst="roundRect">
             <a:avLst>
@@ -5922,7 +5931,7 @@
         <p:spPr>
           <a:xfrm>
             <a:off x="15716160" y="2438280"/>
-            <a:ext cx="6228720" cy="8838360"/>
+            <a:ext cx="6228360" cy="8838000"/>
           </a:xfrm>
           <a:prstGeom prst="roundRect">
             <a:avLst>
@@ -5952,7 +5961,7 @@
         <p:spPr>
           <a:xfrm>
             <a:off x="9756720" y="3137040"/>
-            <a:ext cx="1954800" cy="2015280"/>
+            <a:ext cx="1954440" cy="2014920"/>
           </a:xfrm>
           <a:prstGeom prst="roundRect">
             <a:avLst>
@@ -5984,7 +5993,7 @@
         <p:spPr>
           <a:xfrm>
             <a:off x="16362360" y="3137040"/>
-            <a:ext cx="1954800" cy="2015280"/>
+            <a:ext cx="1954440" cy="2014920"/>
           </a:xfrm>
           <a:prstGeom prst="roundRect">
             <a:avLst>
@@ -6016,7 +6025,7 @@
         <p:spPr>
           <a:xfrm>
             <a:off x="3042360" y="5054760"/>
-            <a:ext cx="4704840" cy="1015200"/>
+            <a:ext cx="4704480" cy="1015200"/>
           </a:xfrm>
           <a:prstGeom prst="rect">
             <a:avLst/>
@@ -6071,7 +6080,7 @@
         <p:spPr>
           <a:xfrm>
             <a:off x="3111840" y="6997680"/>
-            <a:ext cx="4983840" cy="2477160"/>
+            <a:ext cx="4983480" cy="2477160"/>
           </a:xfrm>
           <a:prstGeom prst="rect">
             <a:avLst/>
@@ -6129,7 +6138,7 @@
         <p:spPr>
           <a:xfrm>
             <a:off x="3085560" y="6175440"/>
-            <a:ext cx="3833280" cy="496800"/>
+            <a:ext cx="3832920" cy="496800"/>
           </a:xfrm>
           <a:prstGeom prst="rect">
             <a:avLst/>
@@ -6184,7 +6193,7 @@
         <p:spPr>
           <a:xfrm>
             <a:off x="3200400" y="9651960"/>
-            <a:ext cx="3908160" cy="791640"/>
+            <a:ext cx="3907800" cy="791280"/>
           </a:xfrm>
           <a:prstGeom prst="roundRect">
             <a:avLst>
@@ -6222,7 +6231,7 @@
         <p:spPr>
           <a:xfrm>
             <a:off x="3237840" y="9784440"/>
-            <a:ext cx="3833280" cy="496800"/>
+            <a:ext cx="3832920" cy="496800"/>
           </a:xfrm>
           <a:prstGeom prst="rect">
             <a:avLst/>
@@ -6277,7 +6286,7 @@
         <p:spPr>
           <a:xfrm>
             <a:off x="9681120" y="5054760"/>
-            <a:ext cx="4704840" cy="1015200"/>
+            <a:ext cx="4704480" cy="1015200"/>
           </a:xfrm>
           <a:prstGeom prst="rect">
             <a:avLst/>
@@ -6332,7 +6341,7 @@
         <p:spPr>
           <a:xfrm>
             <a:off x="9750600" y="6997680"/>
-            <a:ext cx="4983840" cy="2477160"/>
+            <a:ext cx="4983480" cy="2477160"/>
           </a:xfrm>
           <a:prstGeom prst="rect">
             <a:avLst/>
@@ -6390,7 +6399,7 @@
         <p:spPr>
           <a:xfrm>
             <a:off x="9724320" y="6175440"/>
-            <a:ext cx="3833280" cy="496800"/>
+            <a:ext cx="3832920" cy="496800"/>
           </a:xfrm>
           <a:prstGeom prst="rect">
             <a:avLst/>
@@ -6445,7 +6454,7 @@
         <p:spPr>
           <a:xfrm>
             <a:off x="9839160" y="9651960"/>
-            <a:ext cx="3908160" cy="791640"/>
+            <a:ext cx="3907800" cy="791280"/>
           </a:xfrm>
           <a:prstGeom prst="roundRect">
             <a:avLst>
@@ -6483,7 +6492,7 @@
         <p:spPr>
           <a:xfrm>
             <a:off x="9876600" y="9784440"/>
-            <a:ext cx="3833280" cy="496800"/>
+            <a:ext cx="3832920" cy="496800"/>
           </a:xfrm>
           <a:prstGeom prst="rect">
             <a:avLst/>
@@ -6538,7 +6547,7 @@
         <p:spPr>
           <a:xfrm>
             <a:off x="16319880" y="5054760"/>
-            <a:ext cx="4704840" cy="1015200"/>
+            <a:ext cx="4704480" cy="1015200"/>
           </a:xfrm>
           <a:prstGeom prst="rect">
             <a:avLst/>
@@ -6593,7 +6602,7 @@
         <p:spPr>
           <a:xfrm>
             <a:off x="16389360" y="6997680"/>
-            <a:ext cx="4983840" cy="2477160"/>
+            <a:ext cx="4983480" cy="2477160"/>
           </a:xfrm>
           <a:prstGeom prst="rect">
             <a:avLst/>
@@ -6651,7 +6660,7 @@
         <p:spPr>
           <a:xfrm>
             <a:off x="16363080" y="6175440"/>
-            <a:ext cx="3833280" cy="496800"/>
+            <a:ext cx="3832920" cy="496800"/>
           </a:xfrm>
           <a:prstGeom prst="rect">
             <a:avLst/>
@@ -6706,7 +6715,7 @@
         <p:spPr>
           <a:xfrm>
             <a:off x="16477920" y="9651960"/>
-            <a:ext cx="3908160" cy="791640"/>
+            <a:ext cx="3907800" cy="791280"/>
           </a:xfrm>
           <a:prstGeom prst="roundRect">
             <a:avLst>
@@ -6744,7 +6753,7 @@
         <p:spPr>
           <a:xfrm>
             <a:off x="16515360" y="9784440"/>
-            <a:ext cx="3833280" cy="496800"/>
+            <a:ext cx="3832920" cy="496800"/>
           </a:xfrm>
           <a:prstGeom prst="rect">
             <a:avLst/>
@@ -6804,7 +6813,7 @@
         <p:txBody>
           <a:bodyPr/>
           <a:p>
-            <a:fld id="{4D3E3D0A-CF7C-40BA-B82D-0237CF008309}" type="slidenum">
+            <a:fld id="{158E5BEB-2E54-47E8-AF0C-51344412D646}" type="slidenum">
               <a:t>3</a:t>
             </a:fld>
           </a:p>
@@ -6848,8 +6857,8 @@
         </p:nvSpPr>
         <p:spPr>
           <a:xfrm>
-            <a:off x="2394720" y="2072880"/>
-            <a:ext cx="18636120" cy="1319760"/>
+            <a:off x="2394720" y="966240"/>
+            <a:ext cx="18635760" cy="1319760"/>
           </a:xfrm>
           <a:prstGeom prst="rect">
             <a:avLst/>
@@ -6895,261 +6904,162 @@
           </a:p>
         </p:txBody>
       </p:sp>
-      <p:sp>
-        <p:nvSpPr>
-          <p:cNvPr id="105" name="Lorem ipsum dolor sit amet, consectetur adipiscing elit, sed do eiusmod tempor incididunt ut labore et dolore magna aliqua. Ut enim ad minim veniam, quis nostrud exercitation ullamco laboris nisi ut aliquip ex ea commodo consequat. Duis aute irure dolor in reprehenderit in voluptate velit esse cillum dolore eu fugiat nulla pariatur. Excepteur sint occaecat cupidatat non proident, sunt in culpa qui officia deserunt mollit anim id est laborum.…"/>
-          <p:cNvSpPr/>
+      <p:pic>
+        <p:nvPicPr>
+          <p:cNvPr id="105" name="" descr=""/>
+          <p:cNvPicPr/>
           <p:nvPr/>
-        </p:nvSpPr>
-        <p:spPr>
-          <a:xfrm>
-            <a:off x="2451240" y="5003640"/>
-            <a:ext cx="19226880" cy="2764440"/>
-          </a:xfrm>
-          <a:prstGeom prst="rect">
-            <a:avLst/>
-          </a:prstGeom>
-          <a:noFill/>
-          <a:ln w="12700">
-            <a:noFill/>
-          </a:ln>
-        </p:spPr>
-        <p:style>
-          <a:lnRef idx="0"/>
-          <a:fillRef idx="0"/>
-          <a:effectRef idx="0"/>
-          <a:fontRef idx="minor"/>
-        </p:style>
-        <p:txBody>
-          <a:bodyPr lIns="50760" rIns="50760" tIns="50760" bIns="50760" anchor="t">
-            <a:spAutoFit/>
-          </a:bodyPr>
-          <a:p>
-            <a:pPr>
+        </p:nvPicPr>
+        <p:blipFill>
+          <a:blip r:embed="rId1"/>
+          <a:stretch/>
+        </p:blipFill>
+        <p:spPr>
+          <a:xfrm>
+            <a:off x="952200" y="2891160"/>
+            <a:ext cx="4762800" cy="4762800"/>
+          </a:xfrm>
+          <a:prstGeom prst="rect">
+            <a:avLst/>
+          </a:prstGeom>
+          <a:ln w="0">
+            <a:noFill/>
+          </a:ln>
+        </p:spPr>
+      </p:pic>
+      <p:sp>
+        <p:nvSpPr>
+          <p:cNvPr id="106" name=""/>
+          <p:cNvSpPr txBox="1"/>
+          <p:nvPr/>
+        </p:nvSpPr>
+        <p:spPr>
+          <a:xfrm>
+            <a:off x="914400" y="8148960"/>
+            <a:ext cx="5029200" cy="2138040"/>
+          </a:xfrm>
+          <a:prstGeom prst="rect">
+            <a:avLst/>
+          </a:prstGeom>
+          <a:noFill/>
+          <a:ln w="0">
+            <a:noFill/>
+          </a:ln>
+        </p:spPr>
+        <p:txBody>
+          <a:bodyPr lIns="90000" rIns="90000" tIns="45000" bIns="45000" anchor="t">
+            <a:noAutofit/>
+          </a:bodyPr>
+          <a:p>
+            <a:r>
+              <a:rPr b="0" lang="en-US" sz="3600" spc="-1" strike="noStrike">
+                <a:latin typeface="Arial"/>
+              </a:rPr>
+              <a:t>Coach Nick</a:t>
+            </a:r>
+            <a:endParaRPr b="0" lang="en-US" sz="3600" spc="-1" strike="noStrike">
+              <a:latin typeface="Arial"/>
+            </a:endParaRPr>
+          </a:p>
+          <a:p>
+            <a:pPr marL="216000" indent="-216000">
               <a:lnSpc>
-                <a:spcPct val="120000"/>
+                <a:spcPct val="100000"/>
               </a:lnSpc>
-              <a:spcBef>
-                <a:spcPts val="2001"/>
-              </a:spcBef>
-              <a:buNone/>
-              <a:tabLst>
-                <a:tab algn="l" pos="0"/>
-              </a:tabLst>
-            </a:pPr>
-            <a:r>
-              <a:rPr b="0" lang="en-US" sz="2600" spc="-1" strike="noStrike">
-                <a:solidFill>
-                  <a:srgbClr val="d2dbe4"/>
-                </a:solidFill>
-                <a:latin typeface="Open Sans"/>
-                <a:ea typeface="Open Sans"/>
-              </a:rPr>
-              <a:t>Имя – Ник, фото\лого, его твиттер и ютуб</a:t>
-            </a:r>
-            <a:endParaRPr b="0" lang="en-US" sz="2600" spc="-1" strike="noStrike">
-              <a:latin typeface="Arial"/>
-            </a:endParaRPr>
-          </a:p>
-          <a:p>
-            <a:pPr>
-              <a:lnSpc>
-                <a:spcPct val="120000"/>
-              </a:lnSpc>
-              <a:spcBef>
-                <a:spcPts val="2001"/>
-              </a:spcBef>
-              <a:buNone/>
-              <a:tabLst>
-                <a:tab algn="l" pos="0"/>
-              </a:tabLst>
-            </a:pPr>
-            <a:r>
-              <a:rPr b="0" lang="en-US" sz="2600" spc="-1" strike="noStrike">
-                <a:solidFill>
-                  <a:srgbClr val="d2dbe4"/>
-                </a:solidFill>
-                <a:latin typeface="Open Sans"/>
-                <a:ea typeface="Open Sans"/>
-              </a:rPr>
-              <a:t>Статистика просмотров\подписчиков</a:t>
-            </a:r>
-            <a:endParaRPr b="0" lang="en-US" sz="2600" spc="-1" strike="noStrike">
-              <a:latin typeface="Arial"/>
-            </a:endParaRPr>
-          </a:p>
-          <a:p>
-            <a:pPr>
-              <a:lnSpc>
-                <a:spcPct val="120000"/>
-              </a:lnSpc>
-              <a:spcBef>
-                <a:spcPts val="2001"/>
-              </a:spcBef>
-              <a:buNone/>
-              <a:tabLst>
-                <a:tab algn="l" pos="0"/>
-              </a:tabLst>
-            </a:pPr>
-            <a:r>
-              <a:rPr b="0" lang="en-US" sz="2600" spc="-1" strike="noStrike">
-                <a:solidFill>
-                  <a:srgbClr val="d2dbe4"/>
-                </a:solidFill>
-                <a:latin typeface="Open Sans"/>
-                <a:ea typeface="Open Sans"/>
-              </a:rPr>
-              <a:t>Примеры твитов</a:t>
-            </a:r>
-            <a:endParaRPr b="0" lang="en-US" sz="2600" spc="-1" strike="noStrike">
-              <a:latin typeface="Arial"/>
-            </a:endParaRPr>
-          </a:p>
-          <a:p>
-            <a:pPr>
-              <a:lnSpc>
-                <a:spcPct val="120000"/>
-              </a:lnSpc>
-              <a:spcBef>
-                <a:spcPts val="2001"/>
-              </a:spcBef>
-              <a:buNone/>
-              <a:tabLst>
-                <a:tab algn="l" pos="0"/>
-              </a:tabLst>
-            </a:pPr>
-            <a:endParaRPr b="0" lang="en-US" sz="2600" spc="-1" strike="noStrike">
-              <a:latin typeface="Arial"/>
-            </a:endParaRPr>
-          </a:p>
-        </p:txBody>
-      </p:sp>
-      <p:sp>
-        <p:nvSpPr>
-          <p:cNvPr id="106" name="Фигура"/>
-          <p:cNvSpPr/>
+              <a:buClr>
+                <a:srgbClr val="ffffff"/>
+              </a:buClr>
+              <a:buSzPct val="45000"/>
+              <a:buFont typeface="Wingdings" charset="2"/>
+              <a:buChar char=""/>
+            </a:pPr>
+            <a:r>
+              <a:rPr b="0" lang="en-US" sz="3600" spc="-1" strike="noStrike">
+                <a:latin typeface="Arial"/>
+              </a:rPr>
+              <a:t>Nick Hauselman</a:t>
+            </a:r>
+            <a:endParaRPr b="0" lang="en-US" sz="3600" spc="-1" strike="noStrike">
+              <a:latin typeface="Arial"/>
+            </a:endParaRPr>
+          </a:p>
+          <a:p>
+            <a:pPr marL="216000" indent="-216000">
+              <a:buClr>
+                <a:srgbClr val="ffffff"/>
+              </a:buClr>
+              <a:buSzPct val="45000"/>
+              <a:buFont typeface="Wingdings" charset="2"/>
+              <a:buChar char=""/>
+            </a:pPr>
+            <a:r>
+              <a:rPr b="0" lang="en-US" sz="3600" spc="-1" strike="noStrike">
+                <a:latin typeface="Arial"/>
+                <a:hlinkClick r:id="rId2"/>
+              </a:rPr>
+              <a:t>твиттере</a:t>
+            </a:r>
+            <a:r>
+              <a:rPr b="0" lang="en-US" sz="3600" spc="-1" strike="noStrike">
+                <a:latin typeface="Arial"/>
+              </a:rPr>
+              <a:t>: 144.5K </a:t>
+            </a:r>
+            <a:endParaRPr b="0" lang="en-US" sz="3600" spc="-1" strike="noStrike">
+              <a:latin typeface="Arial"/>
+            </a:endParaRPr>
+          </a:p>
+          <a:p>
+            <a:pPr marL="216000" indent="-216000">
+              <a:buClr>
+                <a:srgbClr val="ffffff"/>
+              </a:buClr>
+              <a:buSzPct val="45000"/>
+              <a:buFont typeface="Wingdings" charset="2"/>
+              <a:buChar char=""/>
+            </a:pPr>
+            <a:r>
+              <a:rPr b="0" lang="en-US" sz="3600" spc="-1" strike="noStrike">
+                <a:latin typeface="Arial"/>
+                <a:hlinkClick r:id="rId3"/>
+              </a:rPr>
+              <a:t>Ютубе</a:t>
+            </a:r>
+            <a:r>
+              <a:rPr b="0" lang="en-US" sz="3600" spc="-1" strike="noStrike">
+                <a:latin typeface="Arial"/>
+              </a:rPr>
+              <a:t>: 866K</a:t>
+            </a:r>
+            <a:endParaRPr b="0" lang="en-US" sz="3600" spc="-1" strike="noStrike">
+              <a:latin typeface="Arial"/>
+            </a:endParaRPr>
+          </a:p>
+        </p:txBody>
+      </p:sp>
+      <p:pic>
+        <p:nvPicPr>
+          <p:cNvPr id="107" name="" descr=""/>
+          <p:cNvPicPr/>
           <p:nvPr/>
-        </p:nvSpPr>
-        <p:spPr>
-          <a:xfrm>
-            <a:off x="2476440" y="3911760"/>
-            <a:ext cx="1576080" cy="559800"/>
-          </a:xfrm>
-          <a:custGeom>
-            <a:avLst/>
-            <a:gdLst/>
-            <a:ahLst/>
-            <a:rect l="l" t="t" r="r" b="b"/>
-            <a:pathLst>
-              <a:path w="21380" h="21310">
-                <a:moveTo>
-                  <a:pt x="10829" y="4"/>
-                </a:moveTo>
-                <a:cubicBezTo>
-                  <a:pt x="8668" y="-147"/>
-                  <a:pt x="6864" y="4633"/>
-                  <a:pt x="6858" y="10653"/>
-                </a:cubicBezTo>
-                <a:cubicBezTo>
-                  <a:pt x="6852" y="16420"/>
-                  <a:pt x="8513" y="21087"/>
-                  <a:pt x="10581" y="21303"/>
-                </a:cubicBezTo>
-                <a:cubicBezTo>
-                  <a:pt x="12027" y="21453"/>
-                  <a:pt x="13378" y="19280"/>
-                  <a:pt x="14063" y="15706"/>
-                </a:cubicBezTo>
-                <a:cubicBezTo>
-                  <a:pt x="14350" y="14244"/>
-                  <a:pt x="14842" y="13182"/>
-                  <a:pt x="15419" y="12765"/>
-                </a:cubicBezTo>
-                <a:cubicBezTo>
-                  <a:pt x="16212" y="12191"/>
-                  <a:pt x="17052" y="12890"/>
-                  <a:pt x="17603" y="14590"/>
-                </a:cubicBezTo>
-                <a:cubicBezTo>
-                  <a:pt x="18900" y="18813"/>
-                  <a:pt x="21371" y="16270"/>
-                  <a:pt x="21381" y="10698"/>
-                </a:cubicBezTo>
-                <a:cubicBezTo>
-                  <a:pt x="21390" y="5071"/>
-                  <a:pt x="18891" y="2453"/>
-                  <a:pt x="17587" y="6731"/>
-                </a:cubicBezTo>
-                <a:cubicBezTo>
-                  <a:pt x="17150" y="8044"/>
-                  <a:pt x="16527" y="8760"/>
-                  <a:pt x="15887" y="8692"/>
-                </a:cubicBezTo>
-                <a:cubicBezTo>
-                  <a:pt x="15103" y="8610"/>
-                  <a:pt x="14394" y="7388"/>
-                  <a:pt x="14014" y="5464"/>
-                </a:cubicBezTo>
-                <a:cubicBezTo>
-                  <a:pt x="13376" y="2181"/>
-                  <a:pt x="12162" y="97"/>
-                  <a:pt x="10829" y="4"/>
-                </a:cubicBezTo>
-                <a:close/>
-                <a:moveTo>
-                  <a:pt x="2155" y="4559"/>
-                </a:moveTo>
-                <a:cubicBezTo>
-                  <a:pt x="1603" y="4559"/>
-                  <a:pt x="1053" y="5159"/>
-                  <a:pt x="632" y="6339"/>
-                </a:cubicBezTo>
-                <a:cubicBezTo>
-                  <a:pt x="-210" y="8699"/>
-                  <a:pt x="-210" y="12517"/>
-                  <a:pt x="632" y="14877"/>
-                </a:cubicBezTo>
-                <a:cubicBezTo>
-                  <a:pt x="1474" y="17237"/>
-                  <a:pt x="2836" y="17237"/>
-                  <a:pt x="3677" y="14877"/>
-                </a:cubicBezTo>
-                <a:cubicBezTo>
-                  <a:pt x="4519" y="12517"/>
-                  <a:pt x="4519" y="8699"/>
-                  <a:pt x="3677" y="6339"/>
-                </a:cubicBezTo>
-                <a:cubicBezTo>
-                  <a:pt x="3257" y="5159"/>
-                  <a:pt x="2706" y="4559"/>
-                  <a:pt x="2155" y="4559"/>
-                </a:cubicBezTo>
-                <a:close/>
-              </a:path>
-            </a:pathLst>
-          </a:custGeom>
-          <a:gradFill rotWithShape="0">
-            <a:gsLst>
-              <a:gs pos="0">
-                <a:srgbClr val="5e9eee"/>
-              </a:gs>
-              <a:gs pos="100000">
-                <a:srgbClr val="635ed6"/>
-              </a:gs>
-            </a:gsLst>
-            <a:lin ang="2010000"/>
-          </a:gradFill>
-          <a:ln w="12700">
-            <a:noFill/>
-          </a:ln>
-        </p:spPr>
-        <p:style>
-          <a:lnRef idx="0"/>
-          <a:fillRef idx="0"/>
-          <a:effectRef idx="0"/>
-          <a:fontRef idx="minor"/>
-        </p:style>
-      </p:sp>
+        </p:nvPicPr>
+        <p:blipFill>
+          <a:blip r:embed="rId4"/>
+          <a:stretch/>
+        </p:blipFill>
+        <p:spPr>
+          <a:xfrm>
+            <a:off x="6400800" y="2743200"/>
+            <a:ext cx="16916400" cy="10388520"/>
+          </a:xfrm>
+          <a:prstGeom prst="rect">
+            <a:avLst/>
+          </a:prstGeom>
+          <a:ln w="0">
+            <a:noFill/>
+          </a:ln>
+        </p:spPr>
+      </p:pic>
       <p:sp>
         <p:nvSpPr>
           <p:cNvPr id="2" name="PlaceHolder 1"/>
@@ -7164,7 +7074,7 @@
         <p:txBody>
           <a:bodyPr/>
           <a:p>
-            <a:fld id="{7FEB85D4-B585-45B2-A4D4-66DBFF61C7AB}" type="slidenum">
+            <a:fld id="{3B235841-A900-47CA-BB9D-6321DE0A7957}" type="slidenum">
               <a:t>4</a:t>
             </a:fld>
           </a:p>
@@ -7202,7 +7112,7 @@
       </p:grpSpPr>
       <p:sp>
         <p:nvSpPr>
-          <p:cNvPr id="107" name="PlaceHolder 1"/>
+          <p:cNvPr id="108" name="PlaceHolder 1"/>
           <p:cNvSpPr>
             <a:spLocks noGrp="1"/>
           </p:cNvSpPr>
@@ -7213,7 +7123,7 @@
         <p:spPr>
           <a:xfrm>
             <a:off x="1218960" y="547200"/>
-            <a:ext cx="21944520" cy="2289600"/>
+            <a:ext cx="21944160" cy="2289240"/>
           </a:xfrm>
           <a:prstGeom prst="rect">
             <a:avLst/>
@@ -7245,27 +7155,7 @@
                 <a:latin typeface="Maven Pro Medium"/>
                 <a:ea typeface="Maven Pro Medium"/>
               </a:rPr>
-              <a:t>Цели </a:t>
-            </a:r>
-            <a:r>
-              <a:rPr b="0" lang="ru-RU" sz="8000" spc="-1" strike="noStrike">
-                <a:solidFill>
-                  <a:srgbClr val="ffffff"/>
-                </a:solidFill>
-                <a:latin typeface="Maven Pro Medium"/>
-                <a:ea typeface="Maven Pro Medium"/>
-              </a:rPr>
-              <a:t>проек</a:t>
-            </a:r>
-            <a:r>
-              <a:rPr b="0" lang="ru-RU" sz="8000" spc="-1" strike="noStrike">
-                <a:solidFill>
-                  <a:srgbClr val="ffffff"/>
-                </a:solidFill>
-                <a:latin typeface="Maven Pro Medium"/>
-                <a:ea typeface="Maven Pro Medium"/>
-              </a:rPr>
-              <a:t>та</a:t>
+              <a:t>Цели проекта</a:t>
             </a:r>
             <a:endParaRPr b="0" lang="en-US" sz="8000" spc="-1" strike="noStrike">
               <a:latin typeface="Arial"/>
@@ -7275,7 +7165,7 @@
       </p:sp>
       <p:sp>
         <p:nvSpPr>
-          <p:cNvPr id="108" name="PlaceHolder 2"/>
+          <p:cNvPr id="109" name="PlaceHolder 2"/>
           <p:cNvSpPr>
             <a:spLocks noGrp="1"/>
           </p:cNvSpPr>
@@ -7286,7 +7176,7 @@
         <p:spPr>
           <a:xfrm>
             <a:off x="915120" y="3200400"/>
-            <a:ext cx="21944520" cy="8915400"/>
+            <a:ext cx="21944160" cy="8915040"/>
           </a:xfrm>
           <a:prstGeom prst="rect">
             <a:avLst/>
@@ -7494,6 +7384,7 @@
                   <a:srgbClr val="ffffff"/>
                 </a:solidFill>
                 <a:latin typeface="Maven Pro Medium"/>
+                <a:ea typeface="Maven Pro Medium"/>
               </a:rPr>
               <a:t> </a:t>
             </a:r>
@@ -7642,7 +7533,7 @@
         <p:txBody>
           <a:bodyPr/>
           <a:p>
-            <a:fld id="{17D77013-6BBF-48D6-80DF-5F7E34DA20DC}" type="slidenum">
+            <a:fld id="{2D2F0959-08DB-4BF6-9F17-793505104362}" type="slidenum">
               <a:t>5</a:t>
             </a:fld>
           </a:p>
@@ -7680,14 +7571,14 @@
       </p:grpSpPr>
       <p:sp>
         <p:nvSpPr>
-          <p:cNvPr id="109" name="Title text slide 2"/>
+          <p:cNvPr id="110" name="Title text slide 2"/>
           <p:cNvSpPr/>
           <p:nvPr/>
         </p:nvSpPr>
         <p:spPr>
           <a:xfrm>
             <a:off x="2394720" y="2072880"/>
-            <a:ext cx="19550520" cy="1319760"/>
+            <a:ext cx="19550160" cy="1319760"/>
           </a:xfrm>
           <a:prstGeom prst="rect">
             <a:avLst/>
@@ -7735,14 +7626,14 @@
       </p:sp>
       <p:sp>
         <p:nvSpPr>
-          <p:cNvPr id="110" name="Lorem ipsum dolor sit amet, consectetur adipiscing elit, sed do eiusmod tempor incididunt ut labore et dolore magna aliqua. Ut enim ad minim veniam, quis nostrud exercitation ullamco laboris nisi ut aliquip ex ea commodo consequat. Duis aute irure dolor in reprehenderit in voluptate velit esse cillum dolore eu fugiat nulla pariatur. Excepteur sint occaecat cupidatat non proident, sunt in culpa qui officia deserunt mollit anim id est laborum.… 2"/>
+          <p:cNvPr id="111" name="Lorem ipsum dolor sit amet, consectetur adipiscing elit, sed do eiusmod tempor incididunt ut labore et dolore magna aliqua. Ut enim ad minim veniam, quis nostrud exercitation ullamco laboris nisi ut aliquip ex ea commodo consequat. Duis aute irure dolor in reprehenderit in voluptate velit esse cillum dolore eu fugiat nulla pariatur. Excepteur sint occaecat cupidatat non proident, sunt in culpa qui officia deserunt mollit anim id est laborum.… 2"/>
           <p:cNvSpPr/>
           <p:nvPr/>
         </p:nvSpPr>
         <p:spPr>
           <a:xfrm>
             <a:off x="2360520" y="4663440"/>
-            <a:ext cx="19226880" cy="7365960"/>
+            <a:ext cx="19226520" cy="7365960"/>
           </a:xfrm>
           <a:prstGeom prst="rect">
             <a:avLst/>
@@ -7967,7 +7858,7 @@
         <p:txBody>
           <a:bodyPr/>
           <a:p>
-            <a:fld id="{446BD540-CD7C-4F70-AEBD-5A2AF58B8CC6}" type="slidenum">
+            <a:fld id="{087F96E9-A088-4A8C-84EF-4944FF6E5186}" type="slidenum">
               <a:t>6</a:t>
             </a:fld>
           </a:p>
@@ -8005,14 +7896,14 @@
       </p:grpSpPr>
       <p:sp>
         <p:nvSpPr>
-          <p:cNvPr id="111" name="Title text slide"/>
+          <p:cNvPr id="112" name="Title text slide"/>
           <p:cNvSpPr/>
           <p:nvPr/>
         </p:nvSpPr>
         <p:spPr>
           <a:xfrm>
             <a:off x="2394720" y="2072880"/>
-            <a:ext cx="9111600" cy="1319760"/>
+            <a:ext cx="9111240" cy="1319760"/>
           </a:xfrm>
           <a:prstGeom prst="rect">
             <a:avLst/>
@@ -8060,14 +7951,14 @@
       </p:sp>
       <p:sp>
         <p:nvSpPr>
-          <p:cNvPr id="112" name="Lorem ipsum dolor sit amet, consectetur adipiscing elit, sed do eiusmod tempor incididunt ut labore et dolore magna aliqua. Ut enim ad minim veniam, quis nostrud exercitation ullamco laboris nisi ut aliquip ex ea commodo consequat. Duis aute irure dolor in reprehenderit in voluptate velit esse cillum dolore eu fugiat nulla pariatur. Excepteur sint occaecat cupidatat non proident, sunt in culpa qui officia deserunt mollit anim id est laborum.…"/>
+          <p:cNvPr id="113" name="Lorem ipsum dolor sit amet, consectetur adipiscing elit, sed do eiusmod tempor incididunt ut labore et dolore magna aliqua. Ut enim ad minim veniam, quis nostrud exercitation ullamco laboris nisi ut aliquip ex ea commodo consequat. Duis aute irure dolor in reprehenderit in voluptate velit esse cillum dolore eu fugiat nulla pariatur. Excepteur sint occaecat cupidatat non proident, sunt in culpa qui officia deserunt mollit anim id est laborum.…"/>
           <p:cNvSpPr/>
           <p:nvPr/>
         </p:nvSpPr>
         <p:spPr>
           <a:xfrm>
             <a:off x="2451240" y="5003640"/>
-            <a:ext cx="19226880" cy="4408200"/>
+            <a:ext cx="19226520" cy="4408200"/>
           </a:xfrm>
           <a:prstGeom prst="rect">
             <a:avLst/>
@@ -8238,7 +8129,7 @@
         <p:txBody>
           <a:bodyPr/>
           <a:p>
-            <a:fld id="{595E2D1F-7B28-41D3-B842-C185B2E71615}" type="slidenum">
+            <a:fld id="{BAFB064C-3F27-49AE-A834-3CFEA6E261B0}" type="slidenum">
               <a:t>7</a:t>
             </a:fld>
           </a:p>
@@ -8276,14 +8167,14 @@
       </p:grpSpPr>
       <p:sp>
         <p:nvSpPr>
-          <p:cNvPr id="113" name="Title text slide 3"/>
+          <p:cNvPr id="114" name="Title text slide 3"/>
           <p:cNvSpPr/>
           <p:nvPr/>
         </p:nvSpPr>
         <p:spPr>
           <a:xfrm>
             <a:off x="2394720" y="2072880"/>
-            <a:ext cx="19550520" cy="1319760"/>
+            <a:ext cx="19550160" cy="1319760"/>
           </a:xfrm>
           <a:prstGeom prst="rect">
             <a:avLst/>
@@ -8331,14 +8222,14 @@
       </p:sp>
       <p:sp>
         <p:nvSpPr>
-          <p:cNvPr id="114" name="Lorem ipsum dolor sit amet, consectetur adipiscing elit, sed do eiusmod tempor incididunt ut labore et dolore magna aliqua. Ut enim ad minim veniam, quis nostrud exercitation ullamco laboris nisi ut aliquip ex ea commodo consequat. Duis aute irure dolor in reprehenderit in voluptate velit esse cillum dolore eu fugiat nulla pariatur. Excepteur sint occaecat cupidatat non proident, sunt in culpa qui officia deserunt mollit anim id est laborum.… 3"/>
+          <p:cNvPr id="115" name="Lorem ipsum dolor sit amet, consectetur adipiscing elit, sed do eiusmod tempor incididunt ut labore et dolore magna aliqua. Ut enim ad minim veniam, quis nostrud exercitation ullamco laboris nisi ut aliquip ex ea commodo consequat. Duis aute irure dolor in reprehenderit in voluptate velit esse cillum dolore eu fugiat nulla pariatur. Excepteur sint occaecat cupidatat non proident, sunt in culpa qui officia deserunt mollit anim id est laborum.… 3"/>
           <p:cNvSpPr/>
           <p:nvPr/>
         </p:nvSpPr>
         <p:spPr>
           <a:xfrm>
             <a:off x="2451240" y="5003640"/>
-            <a:ext cx="19226880" cy="6232680"/>
+            <a:ext cx="19226520" cy="6232680"/>
           </a:xfrm>
           <a:prstGeom prst="rect">
             <a:avLst/>
@@ -8613,7 +8504,7 @@
         <p:txBody>
           <a:bodyPr/>
           <a:p>
-            <a:fld id="{EFAC2CF9-B393-4E85-88A2-18509C3020AF}" type="slidenum">
+            <a:fld id="{8BDC766B-D72C-49DF-831F-D98994B62A33}" type="slidenum">
               <a:t>8</a:t>
             </a:fld>
           </a:p>
@@ -8651,14 +8542,14 @@
       </p:grpSpPr>
       <p:sp>
         <p:nvSpPr>
-          <p:cNvPr id="115" name="Title text slide 4"/>
+          <p:cNvPr id="116" name="Title text slide 4"/>
           <p:cNvSpPr/>
           <p:nvPr/>
         </p:nvSpPr>
         <p:spPr>
           <a:xfrm>
             <a:off x="2394720" y="2072880"/>
-            <a:ext cx="19550520" cy="1319760"/>
+            <a:ext cx="19550160" cy="1319760"/>
           </a:xfrm>
           <a:prstGeom prst="rect">
             <a:avLst/>
@@ -8706,14 +8597,14 @@
       </p:sp>
       <p:sp>
         <p:nvSpPr>
-          <p:cNvPr id="116" name=""/>
+          <p:cNvPr id="117" name=""/>
           <p:cNvSpPr/>
           <p:nvPr/>
         </p:nvSpPr>
         <p:spPr>
           <a:xfrm>
             <a:off x="1143000" y="5486400"/>
-            <a:ext cx="2057400" cy="2057400"/>
+            <a:ext cx="2057040" cy="2057040"/>
           </a:xfrm>
           <a:prstGeom prst="flowChartMagneticDisk">
             <a:avLst/>
@@ -8739,11 +8630,18 @@
           </a:bodyPr>
           <a:p>
             <a:pPr algn="ctr">
+              <a:lnSpc>
+                <a:spcPct val="100000"/>
+              </a:lnSpc>
               <a:buNone/>
             </a:pPr>
             <a:r>
               <a:rPr b="0" lang="en-US" sz="3200" spc="-1" strike="noStrike">
+                <a:solidFill>
+                  <a:srgbClr val="000000"/>
+                </a:solidFill>
                 <a:latin typeface="Arial"/>
+                <a:ea typeface="DejaVu Sans"/>
               </a:rPr>
               <a:t>DB</a:t>
             </a:r>
@@ -8755,14 +8653,14 @@
       </p:sp>
       <p:sp>
         <p:nvSpPr>
-          <p:cNvPr id="117" name=""/>
+          <p:cNvPr id="118" name=""/>
           <p:cNvSpPr/>
           <p:nvPr/>
         </p:nvSpPr>
         <p:spPr>
           <a:xfrm>
             <a:off x="1143000" y="8915400"/>
-            <a:ext cx="2057400" cy="2286000"/>
+            <a:ext cx="2057040" cy="2285640"/>
           </a:xfrm>
           <a:prstGeom prst="flowChartAlternateProcess">
             <a:avLst/>
@@ -8788,11 +8686,18 @@
           </a:bodyPr>
           <a:p>
             <a:pPr algn="ctr">
+              <a:lnSpc>
+                <a:spcPct val="100000"/>
+              </a:lnSpc>
               <a:buNone/>
             </a:pPr>
             <a:r>
               <a:rPr b="0" lang="en-US" sz="3200" spc="-1" strike="noStrike">
+                <a:solidFill>
+                  <a:srgbClr val="000000"/>
+                </a:solidFill>
                 <a:latin typeface="Arial"/>
+                <a:ea typeface="DejaVu Sans"/>
               </a:rPr>
               <a:t>Список</a:t>
             </a:r>
@@ -8801,7 +8706,11 @@
             </a:br>
             <a:r>
               <a:rPr b="0" lang="en-US" sz="3200" spc="-1" strike="noStrike">
+                <a:solidFill>
+                  <a:srgbClr val="000000"/>
+                </a:solidFill>
                 <a:latin typeface="Arial"/>
+                <a:ea typeface="DejaVu Sans"/>
               </a:rPr>
               <a:t>игр</a:t>
             </a:r>
@@ -8813,14 +8722,14 @@
       </p:sp>
       <p:sp>
         <p:nvSpPr>
-          <p:cNvPr id="118" name=""/>
+          <p:cNvPr id="119" name=""/>
           <p:cNvSpPr/>
           <p:nvPr/>
         </p:nvSpPr>
         <p:spPr>
           <a:xfrm>
             <a:off x="3657600" y="7728840"/>
-            <a:ext cx="1600200" cy="1143000"/>
+            <a:ext cx="1599840" cy="1142640"/>
           </a:xfrm>
           <a:custGeom>
             <a:avLst/>
@@ -8872,14 +8781,14 @@
       </p:sp>
       <p:sp>
         <p:nvSpPr>
-          <p:cNvPr id="119" name=""/>
+          <p:cNvPr id="120" name=""/>
           <p:cNvSpPr/>
           <p:nvPr/>
         </p:nvSpPr>
         <p:spPr>
           <a:xfrm>
             <a:off x="18059400" y="7772400"/>
-            <a:ext cx="1600200" cy="1143000"/>
+            <a:ext cx="1599840" cy="1142640"/>
           </a:xfrm>
           <a:custGeom>
             <a:avLst/>
@@ -8931,14 +8840,14 @@
       </p:sp>
       <p:sp>
         <p:nvSpPr>
-          <p:cNvPr id="120" name=""/>
+          <p:cNvPr id="121" name=""/>
           <p:cNvSpPr/>
           <p:nvPr/>
         </p:nvSpPr>
         <p:spPr>
           <a:xfrm>
             <a:off x="20116800" y="6858000"/>
-            <a:ext cx="3657600" cy="2743200"/>
+            <a:ext cx="3657240" cy="2742840"/>
           </a:xfrm>
           <a:prstGeom prst="wedgeRoundRectCallout">
             <a:avLst>
@@ -8968,11 +8877,18 @@
           </a:bodyPr>
           <a:p>
             <a:pPr algn="ctr">
+              <a:lnSpc>
+                <a:spcPct val="100000"/>
+              </a:lnSpc>
               <a:buNone/>
             </a:pPr>
             <a:r>
               <a:rPr b="0" lang="en-US" sz="3200" spc="-1" strike="noStrike">
+                <a:solidFill>
+                  <a:srgbClr val="000000"/>
+                </a:solidFill>
                 <a:latin typeface="Arial"/>
+                <a:ea typeface="DejaVu Sans"/>
               </a:rPr>
               <a:t>Твиты</a:t>
             </a:r>
@@ -8984,14 +8900,14 @@
       </p:sp>
       <p:sp>
         <p:nvSpPr>
-          <p:cNvPr id="121" name=""/>
+          <p:cNvPr id="122" name=""/>
           <p:cNvSpPr/>
           <p:nvPr/>
         </p:nvSpPr>
         <p:spPr>
           <a:xfrm>
             <a:off x="5735880" y="4007160"/>
-            <a:ext cx="11887200" cy="8565840"/>
+            <a:ext cx="11886840" cy="8565480"/>
           </a:xfrm>
           <a:prstGeom prst="flowChartAlternateProcess">
             <a:avLst/>
@@ -9013,14 +8929,14 @@
       </p:sp>
       <p:sp>
         <p:nvSpPr>
-          <p:cNvPr id="122" name=""/>
+          <p:cNvPr id="123" name=""/>
           <p:cNvSpPr/>
           <p:nvPr/>
         </p:nvSpPr>
         <p:spPr>
           <a:xfrm>
             <a:off x="5735880" y="8229600"/>
-            <a:ext cx="11887200" cy="0"/>
+            <a:ext cx="11887200" cy="360"/>
           </a:xfrm>
           <a:prstGeom prst="line">
             <a:avLst/>
@@ -9041,14 +8957,14 @@
       </p:sp>
       <p:sp>
         <p:nvSpPr>
-          <p:cNvPr id="123" name=""/>
+          <p:cNvPr id="124" name=""/>
           <p:cNvSpPr/>
           <p:nvPr/>
         </p:nvSpPr>
         <p:spPr>
           <a:xfrm>
             <a:off x="14630400" y="5029200"/>
-            <a:ext cx="2286000" cy="2286000"/>
+            <a:ext cx="2285640" cy="2285640"/>
           </a:xfrm>
           <a:prstGeom prst="flowChartAlternateProcess">
             <a:avLst/>
@@ -9074,11 +8990,18 @@
           </a:bodyPr>
           <a:p>
             <a:pPr algn="ctr">
+              <a:lnSpc>
+                <a:spcPct val="100000"/>
+              </a:lnSpc>
               <a:buNone/>
             </a:pPr>
             <a:r>
               <a:rPr b="0" lang="en-US" sz="3200" spc="-1" strike="noStrike">
+                <a:solidFill>
+                  <a:srgbClr val="000000"/>
+                </a:solidFill>
                 <a:latin typeface="Arial"/>
+                <a:ea typeface="DejaVu Sans"/>
               </a:rPr>
               <a:t>LLM</a:t>
             </a:r>
@@ -9090,14 +9013,14 @@
       </p:sp>
       <p:sp>
         <p:nvSpPr>
-          <p:cNvPr id="124" name=""/>
+          <p:cNvPr id="125" name=""/>
           <p:cNvSpPr/>
           <p:nvPr/>
         </p:nvSpPr>
         <p:spPr>
           <a:xfrm>
             <a:off x="14401800" y="9144000"/>
-            <a:ext cx="2286000" cy="2286000"/>
+            <a:ext cx="2285640" cy="2285640"/>
           </a:xfrm>
           <a:prstGeom prst="flowChartAlternateProcess">
             <a:avLst/>
@@ -9123,11 +9046,18 @@
           </a:bodyPr>
           <a:p>
             <a:pPr algn="ctr">
+              <a:lnSpc>
+                <a:spcPct val="100000"/>
+              </a:lnSpc>
               <a:buNone/>
             </a:pPr>
             <a:r>
               <a:rPr b="0" lang="en-US" sz="3200" spc="-1" strike="noStrike">
+                <a:solidFill>
+                  <a:srgbClr val="000000"/>
+                </a:solidFill>
                 <a:latin typeface="Arial"/>
+                <a:ea typeface="DejaVu Sans"/>
               </a:rPr>
               <a:t>LLM</a:t>
             </a:r>
@@ -9139,14 +9069,14 @@
       </p:sp>
       <p:sp>
         <p:nvSpPr>
-          <p:cNvPr id="125" name=""/>
+          <p:cNvPr id="126" name=""/>
           <p:cNvSpPr/>
           <p:nvPr/>
         </p:nvSpPr>
         <p:spPr>
           <a:xfrm>
             <a:off x="6858000" y="9236520"/>
-            <a:ext cx="5943600" cy="2286000"/>
+            <a:ext cx="5943240" cy="2285640"/>
           </a:xfrm>
           <a:prstGeom prst="flowChartAlternateProcess">
             <a:avLst/>
@@ -9172,11 +9102,18 @@
           </a:bodyPr>
           <a:p>
             <a:pPr algn="ctr">
+              <a:lnSpc>
+                <a:spcPct val="100000"/>
+              </a:lnSpc>
               <a:buNone/>
             </a:pPr>
             <a:r>
               <a:rPr b="1" lang="en-US" sz="3200" spc="-1" strike="noStrike">
+                <a:solidFill>
+                  <a:srgbClr val="000000"/>
+                </a:solidFill>
                 <a:latin typeface="Arial"/>
+                <a:ea typeface="DejaVu Sans"/>
               </a:rPr>
               <a:t>Подсистема Сигналов</a:t>
             </a:r>
@@ -9185,7 +9122,11 @@
             </a:br>
             <a:r>
               <a:rPr b="0" lang="en-US" sz="3200" spc="-1" strike="noStrike">
+                <a:solidFill>
+                  <a:srgbClr val="000000"/>
+                </a:solidFill>
                 <a:latin typeface="Arial"/>
+                <a:ea typeface="DejaVu Sans"/>
               </a:rPr>
               <a:t>aka </a:t>
             </a:r>
@@ -9194,7 +9135,11 @@
             </a:br>
             <a:r>
               <a:rPr b="0" lang="en-US" sz="3200" spc="-1" strike="noStrike">
+                <a:solidFill>
+                  <a:srgbClr val="000000"/>
+                </a:solidFill>
                 <a:latin typeface="Arial"/>
+                <a:ea typeface="DejaVu Sans"/>
               </a:rPr>
               <a:t>Расширенная аналитика</a:t>
             </a:r>
@@ -9206,14 +9151,14 @@
       </p:sp>
       <p:sp>
         <p:nvSpPr>
-          <p:cNvPr id="126" name=""/>
+          <p:cNvPr id="127" name=""/>
           <p:cNvSpPr/>
           <p:nvPr/>
         </p:nvSpPr>
         <p:spPr>
           <a:xfrm>
             <a:off x="12801600" y="9829800"/>
-            <a:ext cx="1600200" cy="1143000"/>
+            <a:ext cx="1599840" cy="1142640"/>
           </a:xfrm>
           <a:custGeom>
             <a:avLst/>
@@ -9265,14 +9210,14 @@
       </p:sp>
       <p:sp>
         <p:nvSpPr>
-          <p:cNvPr id="127" name=""/>
+          <p:cNvPr id="128" name=""/>
           <p:cNvSpPr/>
           <p:nvPr/>
         </p:nvSpPr>
         <p:spPr>
           <a:xfrm>
             <a:off x="6629400" y="5029200"/>
-            <a:ext cx="2514600" cy="2286000"/>
+            <a:ext cx="2514240" cy="2285640"/>
           </a:xfrm>
           <a:prstGeom prst="flowChartAlternateProcess">
             <a:avLst/>
@@ -9298,30 +9243,37 @@
           </a:bodyPr>
           <a:p>
             <a:pPr algn="ctr">
+              <a:lnSpc>
+                <a:spcPct val="100000"/>
+              </a:lnSpc>
               <a:buNone/>
             </a:pPr>
             <a:r>
               <a:rPr b="1" lang="en-US" sz="3200" spc="-1" strike="noStrike">
+                <a:solidFill>
+                  <a:srgbClr val="000000"/>
+                </a:solidFill>
                 <a:latin typeface="Arial"/>
+                <a:ea typeface="DejaVu Sans"/>
               </a:rPr>
               <a:t>Детектор Аномалий</a:t>
             </a:r>
-            <a:endParaRPr b="1" lang="en-US" sz="3200" spc="-1" strike="noStrike">
-              <a:latin typeface="Arial"/>
-            </a:endParaRPr>
-          </a:p>
-        </p:txBody>
-      </p:sp>
-      <p:sp>
-        <p:nvSpPr>
-          <p:cNvPr id="128" name=""/>
+            <a:endParaRPr b="0" lang="en-US" sz="3200" spc="-1" strike="noStrike">
+              <a:latin typeface="Arial"/>
+            </a:endParaRPr>
+          </a:p>
+        </p:txBody>
+      </p:sp>
+      <p:sp>
+        <p:nvSpPr>
+          <p:cNvPr id="129" name=""/>
           <p:cNvSpPr/>
           <p:nvPr/>
         </p:nvSpPr>
         <p:spPr>
           <a:xfrm>
             <a:off x="9144000" y="5715000"/>
-            <a:ext cx="1600200" cy="1143000"/>
+            <a:ext cx="1599840" cy="1142640"/>
           </a:xfrm>
           <a:custGeom>
             <a:avLst/>
@@ -9373,14 +9325,14 @@
       </p:sp>
       <p:sp>
         <p:nvSpPr>
-          <p:cNvPr id="129" name=""/>
+          <p:cNvPr id="130" name=""/>
           <p:cNvSpPr/>
           <p:nvPr/>
         </p:nvSpPr>
         <p:spPr>
           <a:xfrm>
             <a:off x="13030200" y="5715000"/>
-            <a:ext cx="1600200" cy="1143000"/>
+            <a:ext cx="1599840" cy="1142640"/>
           </a:xfrm>
           <a:custGeom>
             <a:avLst/>
@@ -9432,14 +9384,14 @@
       </p:sp>
       <p:sp>
         <p:nvSpPr>
-          <p:cNvPr id="130" name=""/>
+          <p:cNvPr id="131" name=""/>
           <p:cNvSpPr/>
           <p:nvPr/>
         </p:nvSpPr>
         <p:spPr>
           <a:xfrm>
             <a:off x="10744200" y="5029200"/>
-            <a:ext cx="2286000" cy="2286000"/>
+            <a:ext cx="2285640" cy="2285640"/>
           </a:xfrm>
           <a:prstGeom prst="flowChartAlternateProcess">
             <a:avLst/>
@@ -9465,11 +9417,18 @@
           </a:bodyPr>
           <a:p>
             <a:pPr algn="ctr">
+              <a:lnSpc>
+                <a:spcPct val="100000"/>
+              </a:lnSpc>
               <a:buNone/>
             </a:pPr>
             <a:r>
               <a:rPr b="0" lang="en-US" sz="3200" spc="-1" strike="noStrike">
+                <a:solidFill>
+                  <a:srgbClr val="000000"/>
+                </a:solidFill>
                 <a:latin typeface="Arial"/>
+                <a:ea typeface="DejaVu Sans"/>
               </a:rPr>
               <a:t>SHAP</a:t>
             </a:r>
@@ -9493,7 +9452,7 @@
         <p:txBody>
           <a:bodyPr/>
           <a:p>
-            <a:fld id="{899AEFE9-EC13-470D-A9AC-D873B4A1561D}" type="slidenum">
+            <a:fld id="{1400A290-BBF3-43CB-B25E-606183187671}" type="slidenum">
               <a:t>9</a:t>
             </a:fld>
           </a:p>

</xml_diff>